<commit_message>
Add a bunch of stuff ...
</commit_message>
<xml_diff>
--- a/Chapter1/DIKM_thesis_figures.pptx
+++ b/Chapter1/DIKM_thesis_figures.pptx
@@ -6,6 +6,8 @@
   </p:sldMasterIdLst>
   <p:sldIdLst>
     <p:sldId id="256" r:id="rId2"/>
+    <p:sldId id="257" r:id="rId3"/>
+    <p:sldId id="258" r:id="rId4"/>
   </p:sldIdLst>
   <p:sldSz cx="12192000" cy="6858000"/>
   <p:notesSz cx="6858000" cy="9144000"/>
@@ -259,7 +261,7 @@
           <a:p>
             <a:fld id="{917302C5-4CD6-C94E-B70B-29AFCEE48580}" type="datetimeFigureOut">
               <a:rPr lang="en-US" smtClean="0"/>
-              <a:t>2/25/19</a:t>
+              <a:t>6/29/19</a:t>
             </a:fld>
             <a:endParaRPr lang="en-US"/>
           </a:p>
@@ -457,7 +459,7 @@
           <a:p>
             <a:fld id="{917302C5-4CD6-C94E-B70B-29AFCEE48580}" type="datetimeFigureOut">
               <a:rPr lang="en-US" smtClean="0"/>
-              <a:t>2/25/19</a:t>
+              <a:t>6/29/19</a:t>
             </a:fld>
             <a:endParaRPr lang="en-US"/>
           </a:p>
@@ -665,7 +667,7 @@
           <a:p>
             <a:fld id="{917302C5-4CD6-C94E-B70B-29AFCEE48580}" type="datetimeFigureOut">
               <a:rPr lang="en-US" smtClean="0"/>
-              <a:t>2/25/19</a:t>
+              <a:t>6/29/19</a:t>
             </a:fld>
             <a:endParaRPr lang="en-US"/>
           </a:p>
@@ -863,7 +865,7 @@
           <a:p>
             <a:fld id="{917302C5-4CD6-C94E-B70B-29AFCEE48580}" type="datetimeFigureOut">
               <a:rPr lang="en-US" smtClean="0"/>
-              <a:t>2/25/19</a:t>
+              <a:t>6/29/19</a:t>
             </a:fld>
             <a:endParaRPr lang="en-US"/>
           </a:p>
@@ -1138,7 +1140,7 @@
           <a:p>
             <a:fld id="{917302C5-4CD6-C94E-B70B-29AFCEE48580}" type="datetimeFigureOut">
               <a:rPr lang="en-US" smtClean="0"/>
-              <a:t>2/25/19</a:t>
+              <a:t>6/29/19</a:t>
             </a:fld>
             <a:endParaRPr lang="en-US"/>
           </a:p>
@@ -1403,7 +1405,7 @@
           <a:p>
             <a:fld id="{917302C5-4CD6-C94E-B70B-29AFCEE48580}" type="datetimeFigureOut">
               <a:rPr lang="en-US" smtClean="0"/>
-              <a:t>2/25/19</a:t>
+              <a:t>6/29/19</a:t>
             </a:fld>
             <a:endParaRPr lang="en-US"/>
           </a:p>
@@ -1815,7 +1817,7 @@
           <a:p>
             <a:fld id="{917302C5-4CD6-C94E-B70B-29AFCEE48580}" type="datetimeFigureOut">
               <a:rPr lang="en-US" smtClean="0"/>
-              <a:t>2/25/19</a:t>
+              <a:t>6/29/19</a:t>
             </a:fld>
             <a:endParaRPr lang="en-US"/>
           </a:p>
@@ -1956,7 +1958,7 @@
           <a:p>
             <a:fld id="{917302C5-4CD6-C94E-B70B-29AFCEE48580}" type="datetimeFigureOut">
               <a:rPr lang="en-US" smtClean="0"/>
-              <a:t>2/25/19</a:t>
+              <a:t>6/29/19</a:t>
             </a:fld>
             <a:endParaRPr lang="en-US"/>
           </a:p>
@@ -2069,7 +2071,7 @@
           <a:p>
             <a:fld id="{917302C5-4CD6-C94E-B70B-29AFCEE48580}" type="datetimeFigureOut">
               <a:rPr lang="en-US" smtClean="0"/>
-              <a:t>2/25/19</a:t>
+              <a:t>6/29/19</a:t>
             </a:fld>
             <a:endParaRPr lang="en-US"/>
           </a:p>
@@ -2380,7 +2382,7 @@
           <a:p>
             <a:fld id="{917302C5-4CD6-C94E-B70B-29AFCEE48580}" type="datetimeFigureOut">
               <a:rPr lang="en-US" smtClean="0"/>
-              <a:t>2/25/19</a:t>
+              <a:t>6/29/19</a:t>
             </a:fld>
             <a:endParaRPr lang="en-US"/>
           </a:p>
@@ -2668,7 +2670,7 @@
           <a:p>
             <a:fld id="{917302C5-4CD6-C94E-B70B-29AFCEE48580}" type="datetimeFigureOut">
               <a:rPr lang="en-US" smtClean="0"/>
-              <a:t>2/25/19</a:t>
+              <a:t>6/29/19</a:t>
             </a:fld>
             <a:endParaRPr lang="en-US"/>
           </a:p>
@@ -2909,7 +2911,7 @@
           <a:p>
             <a:fld id="{917302C5-4CD6-C94E-B70B-29AFCEE48580}" type="datetimeFigureOut">
               <a:rPr lang="en-US" smtClean="0"/>
-              <a:t>2/25/19</a:t>
+              <a:t>6/29/19</a:t>
             </a:fld>
             <a:endParaRPr lang="en-US"/>
           </a:p>
@@ -4022,6 +4024,2841 @@
 </p:sld>
 </file>
 
+<file path=ppt/slides/slide2.xml><?xml version="1.0" encoding="utf-8"?>
+<p:sld xmlns:a="http://schemas.openxmlformats.org/drawingml/2006/main" xmlns:r="http://schemas.openxmlformats.org/officeDocument/2006/relationships" xmlns:p="http://schemas.openxmlformats.org/presentationml/2006/main">
+  <p:cSld>
+    <p:spTree>
+      <p:nvGrpSpPr>
+        <p:cNvPr id="1" name=""/>
+        <p:cNvGrpSpPr/>
+        <p:nvPr/>
+      </p:nvGrpSpPr>
+      <p:grpSpPr>
+        <a:xfrm>
+          <a:off x="0" y="0"/>
+          <a:ext cx="0" cy="0"/>
+          <a:chOff x="0" y="0"/>
+          <a:chExt cx="0" cy="0"/>
+        </a:xfrm>
+      </p:grpSpPr>
+      <p:sp>
+        <p:nvSpPr>
+          <p:cNvPr id="4" name="Rectangle 3">
+            <a:extLst>
+              <a:ext uri="{FF2B5EF4-FFF2-40B4-BE49-F238E27FC236}">
+                <a16:creationId xmlns:a16="http://schemas.microsoft.com/office/drawing/2014/main" id="{B33B362D-893B-AD40-8856-1C754158B9B7}"/>
+              </a:ext>
+            </a:extLst>
+          </p:cNvPr>
+          <p:cNvSpPr/>
+          <p:nvPr/>
+        </p:nvSpPr>
+        <p:spPr>
+          <a:xfrm>
+            <a:off x="1244906" y="2016087"/>
+            <a:ext cx="132202" cy="2853368"/>
+          </a:xfrm>
+          <a:prstGeom prst="rect">
+            <a:avLst/>
+          </a:prstGeom>
+          <a:solidFill>
+            <a:srgbClr val="FF0000"/>
+          </a:solidFill>
+          <a:ln w="38100">
+            <a:solidFill>
+              <a:schemeClr val="tx1"/>
+            </a:solidFill>
+          </a:ln>
+        </p:spPr>
+        <p:style>
+          <a:lnRef idx="2">
+            <a:schemeClr val="accent1">
+              <a:shade val="50000"/>
+            </a:schemeClr>
+          </a:lnRef>
+          <a:fillRef idx="1">
+            <a:schemeClr val="accent1"/>
+          </a:fillRef>
+          <a:effectRef idx="0">
+            <a:schemeClr val="accent1"/>
+          </a:effectRef>
+          <a:fontRef idx="minor">
+            <a:schemeClr val="lt1"/>
+          </a:fontRef>
+        </p:style>
+        <p:txBody>
+          <a:bodyPr rtlCol="0" anchor="ctr"/>
+          <a:lstStyle/>
+          <a:p>
+            <a:pPr algn="ctr"/>
+            <a:endParaRPr lang="en-US" dirty="0"/>
+          </a:p>
+        </p:txBody>
+      </p:sp>
+      <p:sp>
+        <p:nvSpPr>
+          <p:cNvPr id="5" name="Rectangle 4">
+            <a:extLst>
+              <a:ext uri="{FF2B5EF4-FFF2-40B4-BE49-F238E27FC236}">
+                <a16:creationId xmlns:a16="http://schemas.microsoft.com/office/drawing/2014/main" id="{8DC7641D-FB67-6B41-A1F1-857C67EC1AFC}"/>
+              </a:ext>
+            </a:extLst>
+          </p:cNvPr>
+          <p:cNvSpPr/>
+          <p:nvPr/>
+        </p:nvSpPr>
+        <p:spPr>
+          <a:xfrm>
+            <a:off x="1471669" y="2016087"/>
+            <a:ext cx="132202" cy="2853368"/>
+          </a:xfrm>
+          <a:prstGeom prst="rect">
+            <a:avLst/>
+          </a:prstGeom>
+          <a:solidFill>
+            <a:schemeClr val="bg1"/>
+          </a:solidFill>
+          <a:ln w="38100">
+            <a:solidFill>
+              <a:schemeClr val="tx1"/>
+            </a:solidFill>
+          </a:ln>
+        </p:spPr>
+        <p:style>
+          <a:lnRef idx="2">
+            <a:schemeClr val="accent1">
+              <a:shade val="50000"/>
+            </a:schemeClr>
+          </a:lnRef>
+          <a:fillRef idx="1">
+            <a:schemeClr val="accent1"/>
+          </a:fillRef>
+          <a:effectRef idx="0">
+            <a:schemeClr val="accent1"/>
+          </a:effectRef>
+          <a:fontRef idx="minor">
+            <a:schemeClr val="lt1"/>
+          </a:fontRef>
+        </p:style>
+        <p:txBody>
+          <a:bodyPr rtlCol="0" anchor="ctr"/>
+          <a:lstStyle/>
+          <a:p>
+            <a:pPr algn="ctr"/>
+            <a:endParaRPr lang="en-US"/>
+          </a:p>
+        </p:txBody>
+      </p:sp>
+      <p:sp>
+        <p:nvSpPr>
+          <p:cNvPr id="6" name="Rectangle 5">
+            <a:extLst>
+              <a:ext uri="{FF2B5EF4-FFF2-40B4-BE49-F238E27FC236}">
+                <a16:creationId xmlns:a16="http://schemas.microsoft.com/office/drawing/2014/main" id="{5ED029AD-BEC4-BF47-ACCB-F3EA8F646F87}"/>
+              </a:ext>
+            </a:extLst>
+          </p:cNvPr>
+          <p:cNvSpPr/>
+          <p:nvPr/>
+        </p:nvSpPr>
+        <p:spPr>
+          <a:xfrm>
+            <a:off x="1724139" y="2016087"/>
+            <a:ext cx="132202" cy="2853368"/>
+          </a:xfrm>
+          <a:prstGeom prst="rect">
+            <a:avLst/>
+          </a:prstGeom>
+          <a:solidFill>
+            <a:schemeClr val="bg1"/>
+          </a:solidFill>
+          <a:ln w="38100">
+            <a:solidFill>
+              <a:schemeClr val="tx1"/>
+            </a:solidFill>
+          </a:ln>
+        </p:spPr>
+        <p:style>
+          <a:lnRef idx="2">
+            <a:schemeClr val="accent1">
+              <a:shade val="50000"/>
+            </a:schemeClr>
+          </a:lnRef>
+          <a:fillRef idx="1">
+            <a:schemeClr val="accent1"/>
+          </a:fillRef>
+          <a:effectRef idx="0">
+            <a:schemeClr val="accent1"/>
+          </a:effectRef>
+          <a:fontRef idx="minor">
+            <a:schemeClr val="lt1"/>
+          </a:fontRef>
+        </p:style>
+        <p:txBody>
+          <a:bodyPr rtlCol="0" anchor="ctr"/>
+          <a:lstStyle/>
+          <a:p>
+            <a:pPr algn="ctr"/>
+            <a:endParaRPr lang="en-US"/>
+          </a:p>
+        </p:txBody>
+      </p:sp>
+      <p:sp>
+        <p:nvSpPr>
+          <p:cNvPr id="7" name="Rectangle 6">
+            <a:extLst>
+              <a:ext uri="{FF2B5EF4-FFF2-40B4-BE49-F238E27FC236}">
+                <a16:creationId xmlns:a16="http://schemas.microsoft.com/office/drawing/2014/main" id="{D0CD5E6A-0572-2645-82AB-32D67182420A}"/>
+              </a:ext>
+            </a:extLst>
+          </p:cNvPr>
+          <p:cNvSpPr/>
+          <p:nvPr/>
+        </p:nvSpPr>
+        <p:spPr>
+          <a:xfrm>
+            <a:off x="1976609" y="2016087"/>
+            <a:ext cx="132202" cy="2853368"/>
+          </a:xfrm>
+          <a:prstGeom prst="rect">
+            <a:avLst/>
+          </a:prstGeom>
+          <a:solidFill>
+            <a:schemeClr val="bg1"/>
+          </a:solidFill>
+          <a:ln w="38100">
+            <a:solidFill>
+              <a:schemeClr val="tx1"/>
+            </a:solidFill>
+          </a:ln>
+        </p:spPr>
+        <p:style>
+          <a:lnRef idx="2">
+            <a:schemeClr val="accent1">
+              <a:shade val="50000"/>
+            </a:schemeClr>
+          </a:lnRef>
+          <a:fillRef idx="1">
+            <a:schemeClr val="accent1"/>
+          </a:fillRef>
+          <a:effectRef idx="0">
+            <a:schemeClr val="accent1"/>
+          </a:effectRef>
+          <a:fontRef idx="minor">
+            <a:schemeClr val="lt1"/>
+          </a:fontRef>
+        </p:style>
+        <p:txBody>
+          <a:bodyPr rtlCol="0" anchor="ctr"/>
+          <a:lstStyle/>
+          <a:p>
+            <a:pPr algn="ctr"/>
+            <a:endParaRPr lang="en-US"/>
+          </a:p>
+        </p:txBody>
+      </p:sp>
+      <p:sp>
+        <p:nvSpPr>
+          <p:cNvPr id="8" name="Cube 7">
+            <a:extLst>
+              <a:ext uri="{FF2B5EF4-FFF2-40B4-BE49-F238E27FC236}">
+                <a16:creationId xmlns:a16="http://schemas.microsoft.com/office/drawing/2014/main" id="{97EA44E8-9526-8443-907D-4E59203719F9}"/>
+              </a:ext>
+            </a:extLst>
+          </p:cNvPr>
+          <p:cNvSpPr/>
+          <p:nvPr/>
+        </p:nvSpPr>
+        <p:spPr>
+          <a:xfrm>
+            <a:off x="5518705" y="2016087"/>
+            <a:ext cx="822593" cy="2853368"/>
+          </a:xfrm>
+          <a:prstGeom prst="cube">
+            <a:avLst>
+              <a:gd name="adj" fmla="val 75254"/>
+            </a:avLst>
+          </a:prstGeom>
+          <a:solidFill>
+            <a:srgbClr val="92D050"/>
+          </a:solidFill>
+          <a:ln w="28575">
+            <a:solidFill>
+              <a:schemeClr val="tx1"/>
+            </a:solidFill>
+          </a:ln>
+        </p:spPr>
+        <p:style>
+          <a:lnRef idx="2">
+            <a:schemeClr val="accent1">
+              <a:shade val="50000"/>
+            </a:schemeClr>
+          </a:lnRef>
+          <a:fillRef idx="1">
+            <a:schemeClr val="accent1"/>
+          </a:fillRef>
+          <a:effectRef idx="0">
+            <a:schemeClr val="accent1"/>
+          </a:effectRef>
+          <a:fontRef idx="minor">
+            <a:schemeClr val="lt1"/>
+          </a:fontRef>
+        </p:style>
+        <p:txBody>
+          <a:bodyPr rtlCol="0" anchor="ctr"/>
+          <a:lstStyle/>
+          <a:p>
+            <a:pPr algn="ctr"/>
+            <a:endParaRPr lang="en-US" dirty="0"/>
+          </a:p>
+        </p:txBody>
+      </p:sp>
+      <p:sp>
+        <p:nvSpPr>
+          <p:cNvPr id="13" name="TextBox 12">
+            <a:extLst>
+              <a:ext uri="{FF2B5EF4-FFF2-40B4-BE49-F238E27FC236}">
+                <a16:creationId xmlns:a16="http://schemas.microsoft.com/office/drawing/2014/main" id="{C74818B4-E62C-734C-98C9-5D5C04968ABF}"/>
+              </a:ext>
+            </a:extLst>
+          </p:cNvPr>
+          <p:cNvSpPr txBox="1"/>
+          <p:nvPr/>
+        </p:nvSpPr>
+        <p:spPr>
+          <a:xfrm>
+            <a:off x="1160352" y="4869455"/>
+            <a:ext cx="255198" cy="369332"/>
+          </a:xfrm>
+          <a:prstGeom prst="rect">
+            <a:avLst/>
+          </a:prstGeom>
+          <a:noFill/>
+        </p:spPr>
+        <p:txBody>
+          <a:bodyPr wrap="none" rtlCol="0">
+            <a:spAutoFit/>
+          </a:bodyPr>
+          <a:lstStyle/>
+          <a:p>
+            <a:r>
+              <a:rPr lang="en-US" i="1" dirty="0"/>
+              <a:t>f</a:t>
+            </a:r>
+          </a:p>
+        </p:txBody>
+      </p:sp>
+      <p:sp>
+        <p:nvSpPr>
+          <p:cNvPr id="14" name="TextBox 13">
+            <a:extLst>
+              <a:ext uri="{FF2B5EF4-FFF2-40B4-BE49-F238E27FC236}">
+                <a16:creationId xmlns:a16="http://schemas.microsoft.com/office/drawing/2014/main" id="{123EFBDB-AD90-8A45-944E-1C5A5A619911}"/>
+              </a:ext>
+            </a:extLst>
+          </p:cNvPr>
+          <p:cNvSpPr txBox="1"/>
+          <p:nvPr/>
+        </p:nvSpPr>
+        <p:spPr>
+          <a:xfrm>
+            <a:off x="4679371" y="4915621"/>
+            <a:ext cx="1910203" cy="646331"/>
+          </a:xfrm>
+          <a:prstGeom prst="rect">
+            <a:avLst/>
+          </a:prstGeom>
+          <a:noFill/>
+        </p:spPr>
+        <p:txBody>
+          <a:bodyPr wrap="none" rtlCol="0">
+            <a:spAutoFit/>
+          </a:bodyPr>
+          <a:lstStyle/>
+          <a:p>
+            <a:r>
+              <a:rPr lang="en-US" dirty="0"/>
+              <a:t>Beauty Maximized</a:t>
+            </a:r>
+          </a:p>
+          <a:p>
+            <a:pPr algn="ctr"/>
+            <a:r>
+              <a:rPr lang="en-US" dirty="0"/>
+              <a:t>Image</a:t>
+            </a:r>
+            <a:endParaRPr lang="en-GB" dirty="0"/>
+          </a:p>
+        </p:txBody>
+      </p:sp>
+      <p:sp>
+        <p:nvSpPr>
+          <p:cNvPr id="15" name="Cube 14">
+            <a:extLst>
+              <a:ext uri="{FF2B5EF4-FFF2-40B4-BE49-F238E27FC236}">
+                <a16:creationId xmlns:a16="http://schemas.microsoft.com/office/drawing/2014/main" id="{759C9ADE-A669-674F-88C8-AAD88B2042E0}"/>
+              </a:ext>
+            </a:extLst>
+          </p:cNvPr>
+          <p:cNvSpPr/>
+          <p:nvPr/>
+        </p:nvSpPr>
+        <p:spPr>
+          <a:xfrm>
+            <a:off x="2229079" y="2743200"/>
+            <a:ext cx="822593" cy="1371600"/>
+          </a:xfrm>
+          <a:prstGeom prst="cube">
+            <a:avLst>
+              <a:gd name="adj" fmla="val 45000"/>
+            </a:avLst>
+          </a:prstGeom>
+          <a:solidFill>
+            <a:schemeClr val="bg1"/>
+          </a:solidFill>
+          <a:ln w="28575">
+            <a:solidFill>
+              <a:schemeClr val="tx1"/>
+            </a:solidFill>
+          </a:ln>
+        </p:spPr>
+        <p:style>
+          <a:lnRef idx="2">
+            <a:schemeClr val="accent1">
+              <a:shade val="50000"/>
+            </a:schemeClr>
+          </a:lnRef>
+          <a:fillRef idx="1">
+            <a:schemeClr val="accent1"/>
+          </a:fillRef>
+          <a:effectRef idx="0">
+            <a:schemeClr val="accent1"/>
+          </a:effectRef>
+          <a:fontRef idx="minor">
+            <a:schemeClr val="lt1"/>
+          </a:fontRef>
+        </p:style>
+        <p:txBody>
+          <a:bodyPr rtlCol="0" anchor="ctr"/>
+          <a:lstStyle/>
+          <a:p>
+            <a:pPr algn="ctr"/>
+            <a:r>
+              <a:rPr lang="en-US" dirty="0">
+                <a:solidFill>
+                  <a:schemeClr val="tx1"/>
+                </a:solidFill>
+              </a:rPr>
+              <a:t>U</a:t>
+            </a:r>
+            <a:r>
+              <a:rPr lang="en-US" baseline="-25000" dirty="0">
+                <a:solidFill>
+                  <a:schemeClr val="tx1"/>
+                </a:solidFill>
+              </a:rPr>
+              <a:t>1</a:t>
+            </a:r>
+            <a:endParaRPr lang="en-US" dirty="0">
+              <a:solidFill>
+                <a:schemeClr val="tx1"/>
+              </a:solidFill>
+            </a:endParaRPr>
+          </a:p>
+        </p:txBody>
+      </p:sp>
+      <p:sp>
+        <p:nvSpPr>
+          <p:cNvPr id="16" name="Cube 15">
+            <a:extLst>
+              <a:ext uri="{FF2B5EF4-FFF2-40B4-BE49-F238E27FC236}">
+                <a16:creationId xmlns:a16="http://schemas.microsoft.com/office/drawing/2014/main" id="{87EDBA16-648B-6048-B90F-0AEAF312E75E}"/>
+              </a:ext>
+            </a:extLst>
+          </p:cNvPr>
+          <p:cNvSpPr/>
+          <p:nvPr/>
+        </p:nvSpPr>
+        <p:spPr>
+          <a:xfrm>
+            <a:off x="2991997" y="2514600"/>
+            <a:ext cx="822593" cy="1828800"/>
+          </a:xfrm>
+          <a:prstGeom prst="cube">
+            <a:avLst>
+              <a:gd name="adj" fmla="val 45000"/>
+            </a:avLst>
+          </a:prstGeom>
+          <a:solidFill>
+            <a:schemeClr val="bg1"/>
+          </a:solidFill>
+          <a:ln w="28575">
+            <a:solidFill>
+              <a:schemeClr val="tx1"/>
+            </a:solidFill>
+          </a:ln>
+        </p:spPr>
+        <p:style>
+          <a:lnRef idx="2">
+            <a:schemeClr val="accent1">
+              <a:shade val="50000"/>
+            </a:schemeClr>
+          </a:lnRef>
+          <a:fillRef idx="1">
+            <a:schemeClr val="accent1"/>
+          </a:fillRef>
+          <a:effectRef idx="0">
+            <a:schemeClr val="accent1"/>
+          </a:effectRef>
+          <a:fontRef idx="minor">
+            <a:schemeClr val="lt1"/>
+          </a:fontRef>
+        </p:style>
+        <p:txBody>
+          <a:bodyPr rtlCol="0" anchor="ctr"/>
+          <a:lstStyle/>
+          <a:p>
+            <a:pPr algn="ctr"/>
+            <a:r>
+              <a:rPr lang="en-US" dirty="0">
+                <a:solidFill>
+                  <a:schemeClr val="tx1"/>
+                </a:solidFill>
+              </a:rPr>
+              <a:t>U</a:t>
+            </a:r>
+            <a:r>
+              <a:rPr lang="en-US" baseline="-25000" dirty="0">
+                <a:solidFill>
+                  <a:schemeClr val="tx1"/>
+                </a:solidFill>
+              </a:rPr>
+              <a:t>2</a:t>
+            </a:r>
+            <a:endParaRPr lang="en-US" dirty="0">
+              <a:solidFill>
+                <a:schemeClr val="tx1"/>
+              </a:solidFill>
+            </a:endParaRPr>
+          </a:p>
+        </p:txBody>
+      </p:sp>
+      <p:sp>
+        <p:nvSpPr>
+          <p:cNvPr id="17" name="Cube 16">
+            <a:extLst>
+              <a:ext uri="{FF2B5EF4-FFF2-40B4-BE49-F238E27FC236}">
+                <a16:creationId xmlns:a16="http://schemas.microsoft.com/office/drawing/2014/main" id="{B99EE821-553C-C844-A29D-653140C50F3C}"/>
+              </a:ext>
+            </a:extLst>
+          </p:cNvPr>
+          <p:cNvSpPr/>
+          <p:nvPr/>
+        </p:nvSpPr>
+        <p:spPr>
+          <a:xfrm>
+            <a:off x="4314280" y="2279114"/>
+            <a:ext cx="1203277" cy="2327313"/>
+          </a:xfrm>
+          <a:prstGeom prst="cube">
+            <a:avLst>
+              <a:gd name="adj" fmla="val 45000"/>
+            </a:avLst>
+          </a:prstGeom>
+          <a:solidFill>
+            <a:schemeClr val="bg1"/>
+          </a:solidFill>
+          <a:ln w="28575">
+            <a:solidFill>
+              <a:schemeClr val="tx1"/>
+            </a:solidFill>
+          </a:ln>
+        </p:spPr>
+        <p:style>
+          <a:lnRef idx="2">
+            <a:schemeClr val="accent1">
+              <a:shade val="50000"/>
+            </a:schemeClr>
+          </a:lnRef>
+          <a:fillRef idx="1">
+            <a:schemeClr val="accent1"/>
+          </a:fillRef>
+          <a:effectRef idx="0">
+            <a:schemeClr val="accent1"/>
+          </a:effectRef>
+          <a:fontRef idx="minor">
+            <a:schemeClr val="lt1"/>
+          </a:fontRef>
+        </p:style>
+        <p:txBody>
+          <a:bodyPr rtlCol="0" anchor="ctr"/>
+          <a:lstStyle/>
+          <a:p>
+            <a:pPr algn="ctr"/>
+            <a:r>
+              <a:rPr lang="en-US" dirty="0">
+                <a:solidFill>
+                  <a:schemeClr val="tx1"/>
+                </a:solidFill>
+              </a:rPr>
+              <a:t>U</a:t>
+            </a:r>
+            <a:r>
+              <a:rPr lang="en-US" baseline="-25000" dirty="0">
+                <a:solidFill>
+                  <a:schemeClr val="tx1"/>
+                </a:solidFill>
+              </a:rPr>
+              <a:t>N</a:t>
+            </a:r>
+            <a:endParaRPr lang="en-US" dirty="0">
+              <a:solidFill>
+                <a:schemeClr val="tx1"/>
+              </a:solidFill>
+            </a:endParaRPr>
+          </a:p>
+        </p:txBody>
+      </p:sp>
+      <p:sp>
+        <p:nvSpPr>
+          <p:cNvPr id="18" name="Trapezoid 17">
+            <a:extLst>
+              <a:ext uri="{FF2B5EF4-FFF2-40B4-BE49-F238E27FC236}">
+                <a16:creationId xmlns:a16="http://schemas.microsoft.com/office/drawing/2014/main" id="{82CF19E5-0571-4A4C-878D-D8BEACFF1ADB}"/>
+              </a:ext>
+            </a:extLst>
+          </p:cNvPr>
+          <p:cNvSpPr/>
+          <p:nvPr/>
+        </p:nvSpPr>
+        <p:spPr>
+          <a:xfrm rot="5400000">
+            <a:off x="6777509" y="1895773"/>
+            <a:ext cx="2853368" cy="3093997"/>
+          </a:xfrm>
+          <a:prstGeom prst="trapezoid">
+            <a:avLst>
+              <a:gd name="adj" fmla="val 29459"/>
+            </a:avLst>
+          </a:prstGeom>
+          <a:solidFill>
+            <a:schemeClr val="bg1"/>
+          </a:solidFill>
+          <a:ln w="57150">
+            <a:solidFill>
+              <a:schemeClr val="tx1"/>
+            </a:solidFill>
+          </a:ln>
+        </p:spPr>
+        <p:style>
+          <a:lnRef idx="2">
+            <a:schemeClr val="accent1">
+              <a:shade val="50000"/>
+            </a:schemeClr>
+          </a:lnRef>
+          <a:fillRef idx="1">
+            <a:schemeClr val="accent1"/>
+          </a:fillRef>
+          <a:effectRef idx="0">
+            <a:schemeClr val="accent1"/>
+          </a:effectRef>
+          <a:fontRef idx="minor">
+            <a:schemeClr val="lt1"/>
+          </a:fontRef>
+        </p:style>
+        <p:txBody>
+          <a:bodyPr rtlCol="0" anchor="ctr">
+            <a:scene3d>
+              <a:camera prst="orthographicFront">
+                <a:rot lat="0" lon="0" rev="5400000"/>
+              </a:camera>
+              <a:lightRig rig="threePt" dir="t"/>
+            </a:scene3d>
+          </a:bodyPr>
+          <a:lstStyle/>
+          <a:p>
+            <a:pPr algn="ctr"/>
+            <a:r>
+              <a:rPr lang="en-US" b="1" dirty="0">
+                <a:solidFill>
+                  <a:schemeClr val="tx1"/>
+                </a:solidFill>
+              </a:rPr>
+              <a:t>Beauty Classifier</a:t>
+            </a:r>
+          </a:p>
+        </p:txBody>
+      </p:sp>
+      <p:sp>
+        <p:nvSpPr>
+          <p:cNvPr id="19" name="TextBox 18">
+            <a:extLst>
+              <a:ext uri="{FF2B5EF4-FFF2-40B4-BE49-F238E27FC236}">
+                <a16:creationId xmlns:a16="http://schemas.microsoft.com/office/drawing/2014/main" id="{5F227959-DA1C-6D44-8B92-65B8AF822397}"/>
+              </a:ext>
+            </a:extLst>
+          </p:cNvPr>
+          <p:cNvSpPr txBox="1"/>
+          <p:nvPr/>
+        </p:nvSpPr>
+        <p:spPr>
+          <a:xfrm>
+            <a:off x="3582577" y="3044279"/>
+            <a:ext cx="869149" cy="769441"/>
+          </a:xfrm>
+          <a:prstGeom prst="rect">
+            <a:avLst/>
+          </a:prstGeom>
+          <a:noFill/>
+        </p:spPr>
+        <p:txBody>
+          <a:bodyPr wrap="none" rtlCol="0">
+            <a:spAutoFit/>
+          </a:bodyPr>
+          <a:lstStyle/>
+          <a:p>
+            <a:r>
+              <a:rPr lang="en-US" sz="4400" dirty="0"/>
+              <a:t>. . .</a:t>
+            </a:r>
+          </a:p>
+        </p:txBody>
+      </p:sp>
+      <p:sp>
+        <p:nvSpPr>
+          <p:cNvPr id="20" name="Rectangle 19">
+            <a:extLst>
+              <a:ext uri="{FF2B5EF4-FFF2-40B4-BE49-F238E27FC236}">
+                <a16:creationId xmlns:a16="http://schemas.microsoft.com/office/drawing/2014/main" id="{9345DF64-E8B0-0D4B-8DB8-A81AE13591C0}"/>
+              </a:ext>
+            </a:extLst>
+          </p:cNvPr>
+          <p:cNvSpPr/>
+          <p:nvPr/>
+        </p:nvSpPr>
+        <p:spPr>
+          <a:xfrm>
+            <a:off x="9919935" y="2822822"/>
+            <a:ext cx="295456" cy="1235869"/>
+          </a:xfrm>
+          <a:prstGeom prst="rect">
+            <a:avLst/>
+          </a:prstGeom>
+          <a:solidFill>
+            <a:schemeClr val="bg1"/>
+          </a:solidFill>
+          <a:ln w="38100">
+            <a:solidFill>
+              <a:schemeClr val="tx1"/>
+            </a:solidFill>
+          </a:ln>
+        </p:spPr>
+        <p:style>
+          <a:lnRef idx="2">
+            <a:schemeClr val="accent1">
+              <a:shade val="50000"/>
+            </a:schemeClr>
+          </a:lnRef>
+          <a:fillRef idx="1">
+            <a:schemeClr val="accent1"/>
+          </a:fillRef>
+          <a:effectRef idx="0">
+            <a:schemeClr val="accent1"/>
+          </a:effectRef>
+          <a:fontRef idx="minor">
+            <a:schemeClr val="lt1"/>
+          </a:fontRef>
+        </p:style>
+        <p:txBody>
+          <a:bodyPr rtlCol="0" anchor="ctr"/>
+          <a:lstStyle/>
+          <a:p>
+            <a:pPr algn="ctr"/>
+            <a:endParaRPr lang="en-US"/>
+          </a:p>
+        </p:txBody>
+      </p:sp>
+      <p:sp>
+        <p:nvSpPr>
+          <p:cNvPr id="21" name="Oval 20">
+            <a:extLst>
+              <a:ext uri="{FF2B5EF4-FFF2-40B4-BE49-F238E27FC236}">
+                <a16:creationId xmlns:a16="http://schemas.microsoft.com/office/drawing/2014/main" id="{4A634628-E3F5-054C-9518-25B5085867FE}"/>
+              </a:ext>
+            </a:extLst>
+          </p:cNvPr>
+          <p:cNvSpPr/>
+          <p:nvPr/>
+        </p:nvSpPr>
+        <p:spPr>
+          <a:xfrm>
+            <a:off x="9957940" y="2994469"/>
+            <a:ext cx="216000" cy="216000"/>
+          </a:xfrm>
+          <a:prstGeom prst="ellipse">
+            <a:avLst/>
+          </a:prstGeom>
+          <a:solidFill>
+            <a:srgbClr val="92D050"/>
+          </a:solidFill>
+        </p:spPr>
+        <p:style>
+          <a:lnRef idx="2">
+            <a:schemeClr val="accent1">
+              <a:shade val="50000"/>
+            </a:schemeClr>
+          </a:lnRef>
+          <a:fillRef idx="1">
+            <a:schemeClr val="accent1"/>
+          </a:fillRef>
+          <a:effectRef idx="0">
+            <a:schemeClr val="accent1"/>
+          </a:effectRef>
+          <a:fontRef idx="minor">
+            <a:schemeClr val="lt1"/>
+          </a:fontRef>
+        </p:style>
+        <p:txBody>
+          <a:bodyPr rtlCol="0" anchor="ctr"/>
+          <a:lstStyle/>
+          <a:p>
+            <a:pPr algn="ctr"/>
+            <a:endParaRPr lang="en-US" dirty="0"/>
+          </a:p>
+        </p:txBody>
+      </p:sp>
+      <p:sp>
+        <p:nvSpPr>
+          <p:cNvPr id="22" name="Oval 21">
+            <a:extLst>
+              <a:ext uri="{FF2B5EF4-FFF2-40B4-BE49-F238E27FC236}">
+                <a16:creationId xmlns:a16="http://schemas.microsoft.com/office/drawing/2014/main" id="{378216FB-5E0A-5642-A7AE-67EAC4371927}"/>
+              </a:ext>
+            </a:extLst>
+          </p:cNvPr>
+          <p:cNvSpPr/>
+          <p:nvPr/>
+        </p:nvSpPr>
+        <p:spPr>
+          <a:xfrm>
+            <a:off x="9952555" y="3705720"/>
+            <a:ext cx="216000" cy="216000"/>
+          </a:xfrm>
+          <a:prstGeom prst="ellipse">
+            <a:avLst/>
+          </a:prstGeom>
+          <a:solidFill>
+            <a:srgbClr val="FF0000"/>
+          </a:solidFill>
+        </p:spPr>
+        <p:style>
+          <a:lnRef idx="2">
+            <a:schemeClr val="accent1">
+              <a:shade val="50000"/>
+            </a:schemeClr>
+          </a:lnRef>
+          <a:fillRef idx="1">
+            <a:schemeClr val="accent1"/>
+          </a:fillRef>
+          <a:effectRef idx="0">
+            <a:schemeClr val="accent1"/>
+          </a:effectRef>
+          <a:fontRef idx="minor">
+            <a:schemeClr val="lt1"/>
+          </a:fontRef>
+        </p:style>
+        <p:txBody>
+          <a:bodyPr rtlCol="0" anchor="ctr"/>
+          <a:lstStyle/>
+          <a:p>
+            <a:pPr algn="ctr"/>
+            <a:endParaRPr lang="en-US"/>
+          </a:p>
+        </p:txBody>
+      </p:sp>
+      <p:sp>
+        <p:nvSpPr>
+          <p:cNvPr id="23" name="TextBox 22">
+            <a:extLst>
+              <a:ext uri="{FF2B5EF4-FFF2-40B4-BE49-F238E27FC236}">
+                <a16:creationId xmlns:a16="http://schemas.microsoft.com/office/drawing/2014/main" id="{69D1EBAF-24DC-834D-8C9F-49C027478D49}"/>
+              </a:ext>
+            </a:extLst>
+          </p:cNvPr>
+          <p:cNvSpPr txBox="1"/>
+          <p:nvPr/>
+        </p:nvSpPr>
+        <p:spPr>
+          <a:xfrm>
+            <a:off x="10211945" y="2917803"/>
+            <a:ext cx="838691" cy="369332"/>
+          </a:xfrm>
+          <a:prstGeom prst="rect">
+            <a:avLst/>
+          </a:prstGeom>
+          <a:noFill/>
+        </p:spPr>
+        <p:txBody>
+          <a:bodyPr wrap="none" rtlCol="0">
+            <a:spAutoFit/>
+          </a:bodyPr>
+          <a:lstStyle/>
+          <a:p>
+            <a:r>
+              <a:rPr lang="en-US" dirty="0"/>
+              <a:t>Beauty</a:t>
+            </a:r>
+          </a:p>
+        </p:txBody>
+      </p:sp>
+      <p:sp>
+        <p:nvSpPr>
+          <p:cNvPr id="24" name="TextBox 23">
+            <a:extLst>
+              <a:ext uri="{FF2B5EF4-FFF2-40B4-BE49-F238E27FC236}">
+                <a16:creationId xmlns:a16="http://schemas.microsoft.com/office/drawing/2014/main" id="{4334874B-73DF-D348-A891-8EEB04361DFE}"/>
+              </a:ext>
+            </a:extLst>
+          </p:cNvPr>
+          <p:cNvSpPr txBox="1"/>
+          <p:nvPr/>
+        </p:nvSpPr>
+        <p:spPr>
+          <a:xfrm>
+            <a:off x="10188428" y="3629054"/>
+            <a:ext cx="598241" cy="369332"/>
+          </a:xfrm>
+          <a:prstGeom prst="rect">
+            <a:avLst/>
+          </a:prstGeom>
+          <a:noFill/>
+        </p:spPr>
+        <p:txBody>
+          <a:bodyPr wrap="none" rtlCol="0">
+            <a:spAutoFit/>
+          </a:bodyPr>
+          <a:lstStyle/>
+          <a:p>
+            <a:r>
+              <a:rPr lang="en-US" dirty="0"/>
+              <a:t>Ugly</a:t>
+            </a:r>
+          </a:p>
+        </p:txBody>
+      </p:sp>
+      <p:cxnSp>
+        <p:nvCxnSpPr>
+          <p:cNvPr id="27" name="Straight Arrow Connector 26">
+            <a:extLst>
+              <a:ext uri="{FF2B5EF4-FFF2-40B4-BE49-F238E27FC236}">
+                <a16:creationId xmlns:a16="http://schemas.microsoft.com/office/drawing/2014/main" id="{33E2F9BF-5F5E-714E-BBB1-CB00908109C0}"/>
+              </a:ext>
+            </a:extLst>
+          </p:cNvPr>
+          <p:cNvCxnSpPr/>
+          <p:nvPr/>
+        </p:nvCxnSpPr>
+        <p:spPr>
+          <a:xfrm>
+            <a:off x="1311006" y="1571625"/>
+            <a:ext cx="4618995" cy="0"/>
+          </a:xfrm>
+          <a:prstGeom prst="straightConnector1">
+            <a:avLst/>
+          </a:prstGeom>
+          <a:ln w="44450">
+            <a:solidFill>
+              <a:schemeClr val="tx1"/>
+            </a:solidFill>
+            <a:headEnd type="triangle"/>
+            <a:tailEnd type="triangle"/>
+          </a:ln>
+        </p:spPr>
+        <p:style>
+          <a:lnRef idx="1">
+            <a:schemeClr val="accent1"/>
+          </a:lnRef>
+          <a:fillRef idx="0">
+            <a:schemeClr val="accent1"/>
+          </a:fillRef>
+          <a:effectRef idx="0">
+            <a:schemeClr val="accent1"/>
+          </a:effectRef>
+          <a:fontRef idx="minor">
+            <a:schemeClr val="tx1"/>
+          </a:fontRef>
+        </p:style>
+      </p:cxnSp>
+      <p:sp>
+        <p:nvSpPr>
+          <p:cNvPr id="28" name="TextBox 27">
+            <a:extLst>
+              <a:ext uri="{FF2B5EF4-FFF2-40B4-BE49-F238E27FC236}">
+                <a16:creationId xmlns:a16="http://schemas.microsoft.com/office/drawing/2014/main" id="{3A4E58E2-C71D-3F44-ABC3-280290D09602}"/>
+              </a:ext>
+            </a:extLst>
+          </p:cNvPr>
+          <p:cNvSpPr txBox="1"/>
+          <p:nvPr/>
+        </p:nvSpPr>
+        <p:spPr>
+          <a:xfrm>
+            <a:off x="2674218" y="1224276"/>
+            <a:ext cx="1921616" cy="369332"/>
+          </a:xfrm>
+          <a:prstGeom prst="rect">
+            <a:avLst/>
+          </a:prstGeom>
+          <a:noFill/>
+        </p:spPr>
+        <p:txBody>
+          <a:bodyPr wrap="none" rtlCol="0">
+            <a:spAutoFit/>
+          </a:bodyPr>
+          <a:lstStyle/>
+          <a:p>
+            <a:r>
+              <a:rPr lang="en-US" b="1" dirty="0"/>
+              <a:t>Trained Generator</a:t>
+            </a:r>
+          </a:p>
+        </p:txBody>
+      </p:sp>
+      <p:cxnSp>
+        <p:nvCxnSpPr>
+          <p:cNvPr id="29" name="Straight Arrow Connector 28">
+            <a:extLst>
+              <a:ext uri="{FF2B5EF4-FFF2-40B4-BE49-F238E27FC236}">
+                <a16:creationId xmlns:a16="http://schemas.microsoft.com/office/drawing/2014/main" id="{68221A3B-7C6C-EF46-91E2-C6138D0E0F83}"/>
+              </a:ext>
+            </a:extLst>
+          </p:cNvPr>
+          <p:cNvCxnSpPr>
+            <a:cxnSpLocks/>
+          </p:cNvCxnSpPr>
+          <p:nvPr/>
+        </p:nvCxnSpPr>
+        <p:spPr>
+          <a:xfrm>
+            <a:off x="6231813" y="1571625"/>
+            <a:ext cx="3936742" cy="0"/>
+          </a:xfrm>
+          <a:prstGeom prst="straightConnector1">
+            <a:avLst/>
+          </a:prstGeom>
+          <a:ln w="44450">
+            <a:solidFill>
+              <a:schemeClr val="tx1"/>
+            </a:solidFill>
+            <a:headEnd type="triangle"/>
+            <a:tailEnd type="triangle"/>
+          </a:ln>
+        </p:spPr>
+        <p:style>
+          <a:lnRef idx="1">
+            <a:schemeClr val="accent1"/>
+          </a:lnRef>
+          <a:fillRef idx="0">
+            <a:schemeClr val="accent1"/>
+          </a:fillRef>
+          <a:effectRef idx="0">
+            <a:schemeClr val="accent1"/>
+          </a:effectRef>
+          <a:fontRef idx="minor">
+            <a:schemeClr val="tx1"/>
+          </a:fontRef>
+        </p:style>
+      </p:cxnSp>
+      <p:sp>
+        <p:nvSpPr>
+          <p:cNvPr id="31" name="TextBox 30">
+            <a:extLst>
+              <a:ext uri="{FF2B5EF4-FFF2-40B4-BE49-F238E27FC236}">
+                <a16:creationId xmlns:a16="http://schemas.microsoft.com/office/drawing/2014/main" id="{4A68D3ED-33E1-FC43-A4C4-F00661DADE17}"/>
+              </a:ext>
+            </a:extLst>
+          </p:cNvPr>
+          <p:cNvSpPr txBox="1"/>
+          <p:nvPr/>
+        </p:nvSpPr>
+        <p:spPr>
+          <a:xfrm>
+            <a:off x="7314268" y="1224276"/>
+            <a:ext cx="1806007" cy="369332"/>
+          </a:xfrm>
+          <a:prstGeom prst="rect">
+            <a:avLst/>
+          </a:prstGeom>
+          <a:noFill/>
+        </p:spPr>
+        <p:txBody>
+          <a:bodyPr wrap="none" rtlCol="0">
+            <a:spAutoFit/>
+          </a:bodyPr>
+          <a:lstStyle/>
+          <a:p>
+            <a:r>
+              <a:rPr lang="en-US" b="1" dirty="0"/>
+              <a:t>Trained Classifier</a:t>
+            </a:r>
+          </a:p>
+        </p:txBody>
+      </p:sp>
+      <p:cxnSp>
+        <p:nvCxnSpPr>
+          <p:cNvPr id="32" name="Straight Arrow Connector 31">
+            <a:extLst>
+              <a:ext uri="{FF2B5EF4-FFF2-40B4-BE49-F238E27FC236}">
+                <a16:creationId xmlns:a16="http://schemas.microsoft.com/office/drawing/2014/main" id="{AA7A69F6-87C2-FD4D-9178-5E7CC327CA4E}"/>
+              </a:ext>
+            </a:extLst>
+          </p:cNvPr>
+          <p:cNvCxnSpPr>
+            <a:cxnSpLocks/>
+          </p:cNvCxnSpPr>
+          <p:nvPr/>
+        </p:nvCxnSpPr>
+        <p:spPr>
+          <a:xfrm>
+            <a:off x="2282974" y="4915621"/>
+            <a:ext cx="2855290" cy="0"/>
+          </a:xfrm>
+          <a:prstGeom prst="straightConnector1">
+            <a:avLst/>
+          </a:prstGeom>
+          <a:ln w="44450">
+            <a:solidFill>
+              <a:schemeClr val="tx1"/>
+            </a:solidFill>
+            <a:headEnd type="triangle"/>
+            <a:tailEnd type="triangle"/>
+          </a:ln>
+        </p:spPr>
+        <p:style>
+          <a:lnRef idx="1">
+            <a:schemeClr val="accent1"/>
+          </a:lnRef>
+          <a:fillRef idx="0">
+            <a:schemeClr val="accent1"/>
+          </a:fillRef>
+          <a:effectRef idx="0">
+            <a:schemeClr val="accent1"/>
+          </a:effectRef>
+          <a:fontRef idx="minor">
+            <a:schemeClr val="tx1"/>
+          </a:fontRef>
+        </p:style>
+      </p:cxnSp>
+      <p:sp>
+        <p:nvSpPr>
+          <p:cNvPr id="34" name="TextBox 33">
+            <a:extLst>
+              <a:ext uri="{FF2B5EF4-FFF2-40B4-BE49-F238E27FC236}">
+                <a16:creationId xmlns:a16="http://schemas.microsoft.com/office/drawing/2014/main" id="{1FB4285E-8E90-E84E-844C-454C18C1D5F1}"/>
+              </a:ext>
+            </a:extLst>
+          </p:cNvPr>
+          <p:cNvSpPr txBox="1"/>
+          <p:nvPr/>
+        </p:nvSpPr>
+        <p:spPr>
+          <a:xfrm>
+            <a:off x="2969905" y="4578885"/>
+            <a:ext cx="1687706" cy="369332"/>
+          </a:xfrm>
+          <a:prstGeom prst="rect">
+            <a:avLst/>
+          </a:prstGeom>
+          <a:noFill/>
+        </p:spPr>
+        <p:txBody>
+          <a:bodyPr wrap="none" rtlCol="0">
+            <a:spAutoFit/>
+          </a:bodyPr>
+          <a:lstStyle/>
+          <a:p>
+            <a:r>
+              <a:rPr lang="en-US" b="1" dirty="0"/>
+              <a:t>Up-Convolution</a:t>
+            </a:r>
+          </a:p>
+        </p:txBody>
+      </p:sp>
+      <p:cxnSp>
+        <p:nvCxnSpPr>
+          <p:cNvPr id="36" name="Curved Connector 35">
+            <a:extLst>
+              <a:ext uri="{FF2B5EF4-FFF2-40B4-BE49-F238E27FC236}">
+                <a16:creationId xmlns:a16="http://schemas.microsoft.com/office/drawing/2014/main" id="{BA6A36AB-6A91-0C43-87F5-02B0150E8F4B}"/>
+              </a:ext>
+            </a:extLst>
+          </p:cNvPr>
+          <p:cNvCxnSpPr>
+            <a:cxnSpLocks/>
+            <a:stCxn id="21" idx="2"/>
+          </p:cNvCxnSpPr>
+          <p:nvPr/>
+        </p:nvCxnSpPr>
+        <p:spPr>
+          <a:xfrm rot="10800000" flipV="1">
+            <a:off x="1311006" y="3102469"/>
+            <a:ext cx="8646934" cy="1166822"/>
+          </a:xfrm>
+          <a:prstGeom prst="curvedConnector3">
+            <a:avLst/>
+          </a:prstGeom>
+          <a:ln w="44450">
+            <a:solidFill>
+              <a:srgbClr val="FF0000"/>
+            </a:solidFill>
+            <a:prstDash val="dash"/>
+            <a:headEnd type="triangle"/>
+            <a:tailEnd type="triangle"/>
+          </a:ln>
+        </p:spPr>
+        <p:style>
+          <a:lnRef idx="1">
+            <a:schemeClr val="accent1"/>
+          </a:lnRef>
+          <a:fillRef idx="0">
+            <a:schemeClr val="accent1"/>
+          </a:fillRef>
+          <a:effectRef idx="0">
+            <a:schemeClr val="accent1"/>
+          </a:effectRef>
+          <a:fontRef idx="minor">
+            <a:schemeClr val="tx1"/>
+          </a:fontRef>
+        </p:style>
+      </p:cxnSp>
+    </p:spTree>
+    <p:extLst>
+      <p:ext uri="{BB962C8B-B14F-4D97-AF65-F5344CB8AC3E}">
+        <p14:creationId xmlns:p14="http://schemas.microsoft.com/office/powerpoint/2010/main" val="1751026281"/>
+      </p:ext>
+    </p:extLst>
+  </p:cSld>
+  <p:clrMapOvr>
+    <a:masterClrMapping/>
+  </p:clrMapOvr>
+</p:sld>
+</file>
+
+<file path=ppt/slides/slide3.xml><?xml version="1.0" encoding="utf-8"?>
+<p:sld xmlns:a="http://schemas.openxmlformats.org/drawingml/2006/main" xmlns:r="http://schemas.openxmlformats.org/officeDocument/2006/relationships" xmlns:p="http://schemas.openxmlformats.org/presentationml/2006/main">
+  <p:cSld>
+    <p:spTree>
+      <p:nvGrpSpPr>
+        <p:cNvPr id="1" name=""/>
+        <p:cNvGrpSpPr/>
+        <p:nvPr/>
+      </p:nvGrpSpPr>
+      <p:grpSpPr>
+        <a:xfrm>
+          <a:off x="0" y="0"/>
+          <a:ext cx="0" cy="0"/>
+          <a:chOff x="0" y="0"/>
+          <a:chExt cx="0" cy="0"/>
+        </a:xfrm>
+      </p:grpSpPr>
+      <p:grpSp>
+        <p:nvGrpSpPr>
+          <p:cNvPr id="43" name="Group 42">
+            <a:extLst>
+              <a:ext uri="{FF2B5EF4-FFF2-40B4-BE49-F238E27FC236}">
+                <a16:creationId xmlns:a16="http://schemas.microsoft.com/office/drawing/2014/main" id="{BE976466-CD16-A044-8B7B-B7B593F98C95}"/>
+              </a:ext>
+            </a:extLst>
+          </p:cNvPr>
+          <p:cNvGrpSpPr/>
+          <p:nvPr/>
+        </p:nvGrpSpPr>
+        <p:grpSpPr>
+          <a:xfrm>
+            <a:off x="1259036" y="1241342"/>
+            <a:ext cx="10259557" cy="4899896"/>
+            <a:chOff x="330349" y="1212767"/>
+            <a:chExt cx="10259557" cy="4899896"/>
+          </a:xfrm>
+        </p:grpSpPr>
+        <p:sp>
+          <p:nvSpPr>
+            <p:cNvPr id="3" name="Cube 2">
+              <a:extLst>
+                <a:ext uri="{FF2B5EF4-FFF2-40B4-BE49-F238E27FC236}">
+                  <a16:creationId xmlns:a16="http://schemas.microsoft.com/office/drawing/2014/main" id="{E8C8A612-42D3-5F4D-8858-3C41B23E86EA}"/>
+                </a:ext>
+              </a:extLst>
+            </p:cNvPr>
+            <p:cNvSpPr/>
+            <p:nvPr/>
+          </p:nvSpPr>
+          <p:spPr>
+            <a:xfrm>
+              <a:off x="1946698" y="1887499"/>
+              <a:ext cx="1300708" cy="2853367"/>
+            </a:xfrm>
+            <a:prstGeom prst="cube">
+              <a:avLst>
+                <a:gd name="adj" fmla="val 45000"/>
+              </a:avLst>
+            </a:prstGeom>
+            <a:solidFill>
+              <a:schemeClr val="bg1"/>
+            </a:solidFill>
+            <a:ln w="28575">
+              <a:solidFill>
+                <a:schemeClr val="tx1"/>
+              </a:solidFill>
+            </a:ln>
+          </p:spPr>
+          <p:style>
+            <a:lnRef idx="2">
+              <a:schemeClr val="accent1">
+                <a:shade val="50000"/>
+              </a:schemeClr>
+            </a:lnRef>
+            <a:fillRef idx="1">
+              <a:schemeClr val="accent1"/>
+            </a:fillRef>
+            <a:effectRef idx="0">
+              <a:schemeClr val="accent1"/>
+            </a:effectRef>
+            <a:fontRef idx="minor">
+              <a:schemeClr val="lt1"/>
+            </a:fontRef>
+          </p:style>
+          <p:txBody>
+            <a:bodyPr rtlCol="0" anchor="ctr"/>
+            <a:lstStyle/>
+            <a:p>
+              <a:pPr algn="ctr"/>
+              <a:r>
+                <a:rPr lang="en-US" dirty="0">
+                  <a:solidFill>
+                    <a:schemeClr val="tx1"/>
+                  </a:solidFill>
+                </a:rPr>
+                <a:t>Conv</a:t>
+              </a:r>
+            </a:p>
+          </p:txBody>
+        </p:sp>
+        <p:sp>
+          <p:nvSpPr>
+            <p:cNvPr id="5" name="Trapezoid 4">
+              <a:extLst>
+                <a:ext uri="{FF2B5EF4-FFF2-40B4-BE49-F238E27FC236}">
+                  <a16:creationId xmlns:a16="http://schemas.microsoft.com/office/drawing/2014/main" id="{0BD9F0AA-0562-C940-A9AA-6A33A7BECE0A}"/>
+                </a:ext>
+              </a:extLst>
+            </p:cNvPr>
+            <p:cNvSpPr/>
+            <p:nvPr/>
+          </p:nvSpPr>
+          <p:spPr>
+            <a:xfrm rot="5400000">
+              <a:off x="2312886" y="3010054"/>
+              <a:ext cx="2605657" cy="500842"/>
+            </a:xfrm>
+            <a:prstGeom prst="trapezoid">
+              <a:avLst>
+                <a:gd name="adj" fmla="val 86513"/>
+              </a:avLst>
+            </a:prstGeom>
+            <a:solidFill>
+              <a:schemeClr val="bg1"/>
+            </a:solidFill>
+            <a:ln w="57150">
+              <a:solidFill>
+                <a:schemeClr val="tx1"/>
+              </a:solidFill>
+            </a:ln>
+          </p:spPr>
+          <p:style>
+            <a:lnRef idx="2">
+              <a:schemeClr val="accent1">
+                <a:shade val="50000"/>
+              </a:schemeClr>
+            </a:lnRef>
+            <a:fillRef idx="1">
+              <a:schemeClr val="accent1"/>
+            </a:fillRef>
+            <a:effectRef idx="0">
+              <a:schemeClr val="accent1"/>
+            </a:effectRef>
+            <a:fontRef idx="minor">
+              <a:schemeClr val="lt1"/>
+            </a:fontRef>
+          </p:style>
+          <p:txBody>
+            <a:bodyPr rtlCol="0" anchor="ctr">
+              <a:scene3d>
+                <a:camera prst="orthographicFront">
+                  <a:rot lat="0" lon="0" rev="0"/>
+                </a:camera>
+                <a:lightRig rig="threePt" dir="t"/>
+              </a:scene3d>
+            </a:bodyPr>
+            <a:lstStyle/>
+            <a:p>
+              <a:pPr algn="ctr"/>
+              <a:r>
+                <a:rPr lang="en-US" b="1" dirty="0">
+                  <a:solidFill>
+                    <a:schemeClr val="tx1"/>
+                  </a:solidFill>
+                </a:rPr>
+                <a:t>Max Pooling</a:t>
+              </a:r>
+            </a:p>
+          </p:txBody>
+        </p:sp>
+        <p:sp>
+          <p:nvSpPr>
+            <p:cNvPr id="6" name="Cube 5">
+              <a:extLst>
+                <a:ext uri="{FF2B5EF4-FFF2-40B4-BE49-F238E27FC236}">
+                  <a16:creationId xmlns:a16="http://schemas.microsoft.com/office/drawing/2014/main" id="{8B606C6A-7A3B-2448-96E1-00430440811B}"/>
+                </a:ext>
+              </a:extLst>
+            </p:cNvPr>
+            <p:cNvSpPr/>
+            <p:nvPr/>
+          </p:nvSpPr>
+          <p:spPr>
+            <a:xfrm>
+              <a:off x="3960701" y="2193905"/>
+              <a:ext cx="852487" cy="2141057"/>
+            </a:xfrm>
+            <a:prstGeom prst="cube">
+              <a:avLst>
+                <a:gd name="adj" fmla="val 45000"/>
+              </a:avLst>
+            </a:prstGeom>
+            <a:solidFill>
+              <a:schemeClr val="bg1"/>
+            </a:solidFill>
+            <a:ln w="28575">
+              <a:solidFill>
+                <a:schemeClr val="tx1"/>
+              </a:solidFill>
+            </a:ln>
+          </p:spPr>
+          <p:style>
+            <a:lnRef idx="2">
+              <a:schemeClr val="accent1">
+                <a:shade val="50000"/>
+              </a:schemeClr>
+            </a:lnRef>
+            <a:fillRef idx="1">
+              <a:schemeClr val="accent1"/>
+            </a:fillRef>
+            <a:effectRef idx="0">
+              <a:schemeClr val="accent1"/>
+            </a:effectRef>
+            <a:fontRef idx="minor">
+              <a:schemeClr val="lt1"/>
+            </a:fontRef>
+          </p:style>
+          <p:txBody>
+            <a:bodyPr rtlCol="0" anchor="ctr"/>
+            <a:lstStyle/>
+            <a:p>
+              <a:pPr algn="ctr"/>
+              <a:r>
+                <a:rPr lang="en-US" sz="1000" dirty="0">
+                  <a:solidFill>
+                    <a:schemeClr val="tx1"/>
+                  </a:solidFill>
+                </a:rPr>
+                <a:t>Conv</a:t>
+              </a:r>
+            </a:p>
+            <a:p>
+              <a:pPr algn="ctr"/>
+              <a:endParaRPr lang="en-US" sz="1200" dirty="0">
+                <a:solidFill>
+                  <a:schemeClr val="tx1"/>
+                </a:solidFill>
+              </a:endParaRPr>
+            </a:p>
+          </p:txBody>
+        </p:sp>
+        <p:sp>
+          <p:nvSpPr>
+            <p:cNvPr id="7" name="Trapezoid 6">
+              <a:extLst>
+                <a:ext uri="{FF2B5EF4-FFF2-40B4-BE49-F238E27FC236}">
+                  <a16:creationId xmlns:a16="http://schemas.microsoft.com/office/drawing/2014/main" id="{EC657971-4235-6C40-9A2E-25CD4BDA2E54}"/>
+                </a:ext>
+              </a:extLst>
+            </p:cNvPr>
+            <p:cNvSpPr/>
+            <p:nvPr/>
+          </p:nvSpPr>
+          <p:spPr>
+            <a:xfrm rot="5400000">
+              <a:off x="4087647" y="3014011"/>
+              <a:ext cx="2141055" cy="500843"/>
+            </a:xfrm>
+            <a:prstGeom prst="trapezoid">
+              <a:avLst>
+                <a:gd name="adj" fmla="val 86513"/>
+              </a:avLst>
+            </a:prstGeom>
+            <a:solidFill>
+              <a:schemeClr val="bg1"/>
+            </a:solidFill>
+            <a:ln w="57150">
+              <a:solidFill>
+                <a:schemeClr val="tx1"/>
+              </a:solidFill>
+            </a:ln>
+          </p:spPr>
+          <p:style>
+            <a:lnRef idx="2">
+              <a:schemeClr val="accent1">
+                <a:shade val="50000"/>
+              </a:schemeClr>
+            </a:lnRef>
+            <a:fillRef idx="1">
+              <a:schemeClr val="accent1"/>
+            </a:fillRef>
+            <a:effectRef idx="0">
+              <a:schemeClr val="accent1"/>
+            </a:effectRef>
+            <a:fontRef idx="minor">
+              <a:schemeClr val="lt1"/>
+            </a:fontRef>
+          </p:style>
+          <p:txBody>
+            <a:bodyPr rtlCol="0" anchor="ctr">
+              <a:scene3d>
+                <a:camera prst="orthographicFront">
+                  <a:rot lat="0" lon="0" rev="0"/>
+                </a:camera>
+                <a:lightRig rig="threePt" dir="t"/>
+              </a:scene3d>
+            </a:bodyPr>
+            <a:lstStyle/>
+            <a:p>
+              <a:pPr algn="ctr"/>
+              <a:r>
+                <a:rPr lang="en-US" b="1" dirty="0">
+                  <a:solidFill>
+                    <a:schemeClr val="tx1"/>
+                  </a:solidFill>
+                </a:rPr>
+                <a:t>Max Pooling</a:t>
+              </a:r>
+            </a:p>
+          </p:txBody>
+        </p:sp>
+        <p:sp>
+          <p:nvSpPr>
+            <p:cNvPr id="8" name="Cube 7">
+              <a:extLst>
+                <a:ext uri="{FF2B5EF4-FFF2-40B4-BE49-F238E27FC236}">
+                  <a16:creationId xmlns:a16="http://schemas.microsoft.com/office/drawing/2014/main" id="{D52492FB-98C2-BC40-85D3-C9480A583299}"/>
+                </a:ext>
+              </a:extLst>
+            </p:cNvPr>
+            <p:cNvSpPr/>
+            <p:nvPr/>
+          </p:nvSpPr>
+          <p:spPr>
+            <a:xfrm>
+              <a:off x="5538008" y="2428875"/>
+              <a:ext cx="655484" cy="1663199"/>
+            </a:xfrm>
+            <a:prstGeom prst="cube">
+              <a:avLst>
+                <a:gd name="adj" fmla="val 45000"/>
+              </a:avLst>
+            </a:prstGeom>
+            <a:solidFill>
+              <a:schemeClr val="bg1"/>
+            </a:solidFill>
+            <a:ln w="28575">
+              <a:solidFill>
+                <a:schemeClr val="tx1"/>
+              </a:solidFill>
+            </a:ln>
+          </p:spPr>
+          <p:style>
+            <a:lnRef idx="2">
+              <a:schemeClr val="accent1">
+                <a:shade val="50000"/>
+              </a:schemeClr>
+            </a:lnRef>
+            <a:fillRef idx="1">
+              <a:schemeClr val="accent1"/>
+            </a:fillRef>
+            <a:effectRef idx="0">
+              <a:schemeClr val="accent1"/>
+            </a:effectRef>
+            <a:fontRef idx="minor">
+              <a:schemeClr val="lt1"/>
+            </a:fontRef>
+          </p:style>
+          <p:txBody>
+            <a:bodyPr rtlCol="0" anchor="ctr"/>
+            <a:lstStyle/>
+            <a:p>
+              <a:pPr algn="ctr"/>
+              <a:endParaRPr lang="en-US" dirty="0">
+                <a:solidFill>
+                  <a:schemeClr val="tx1"/>
+                </a:solidFill>
+              </a:endParaRPr>
+            </a:p>
+          </p:txBody>
+        </p:sp>
+        <p:sp>
+          <p:nvSpPr>
+            <p:cNvPr id="9" name="Trapezoid 8">
+              <a:extLst>
+                <a:ext uri="{FF2B5EF4-FFF2-40B4-BE49-F238E27FC236}">
+                  <a16:creationId xmlns:a16="http://schemas.microsoft.com/office/drawing/2014/main" id="{1B762FAC-8DAA-5F47-81C8-19F70DCE2637}"/>
+                </a:ext>
+              </a:extLst>
+            </p:cNvPr>
+            <p:cNvSpPr/>
+            <p:nvPr/>
+          </p:nvSpPr>
+          <p:spPr>
+            <a:xfrm rot="5400000">
+              <a:off x="5780158" y="3073615"/>
+              <a:ext cx="1459210" cy="373718"/>
+            </a:xfrm>
+            <a:prstGeom prst="trapezoid">
+              <a:avLst>
+                <a:gd name="adj" fmla="val 86513"/>
+              </a:avLst>
+            </a:prstGeom>
+            <a:solidFill>
+              <a:schemeClr val="bg1"/>
+            </a:solidFill>
+            <a:ln w="50800">
+              <a:solidFill>
+                <a:schemeClr val="tx1"/>
+              </a:solidFill>
+            </a:ln>
+          </p:spPr>
+          <p:style>
+            <a:lnRef idx="2">
+              <a:schemeClr val="accent1">
+                <a:shade val="50000"/>
+              </a:schemeClr>
+            </a:lnRef>
+            <a:fillRef idx="1">
+              <a:schemeClr val="accent1"/>
+            </a:fillRef>
+            <a:effectRef idx="0">
+              <a:schemeClr val="accent1"/>
+            </a:effectRef>
+            <a:fontRef idx="minor">
+              <a:schemeClr val="lt1"/>
+            </a:fontRef>
+          </p:style>
+          <p:txBody>
+            <a:bodyPr rtlCol="0" anchor="ctr">
+              <a:scene3d>
+                <a:camera prst="orthographicFront">
+                  <a:rot lat="0" lon="0" rev="0"/>
+                </a:camera>
+                <a:lightRig rig="threePt" dir="t"/>
+              </a:scene3d>
+            </a:bodyPr>
+            <a:lstStyle/>
+            <a:p>
+              <a:pPr algn="ctr"/>
+              <a:r>
+                <a:rPr lang="en-US" sz="1600" b="1" dirty="0">
+                  <a:solidFill>
+                    <a:schemeClr val="tx1"/>
+                  </a:solidFill>
+                </a:rPr>
+                <a:t>Max Pool</a:t>
+              </a:r>
+            </a:p>
+          </p:txBody>
+        </p:sp>
+        <p:sp>
+          <p:nvSpPr>
+            <p:cNvPr id="10" name="Cube 9">
+              <a:extLst>
+                <a:ext uri="{FF2B5EF4-FFF2-40B4-BE49-F238E27FC236}">
+                  <a16:creationId xmlns:a16="http://schemas.microsoft.com/office/drawing/2014/main" id="{471EE9C6-2538-3643-8A75-22EE8FFFA72B}"/>
+                </a:ext>
+              </a:extLst>
+            </p:cNvPr>
+            <p:cNvSpPr/>
+            <p:nvPr/>
+          </p:nvSpPr>
+          <p:spPr>
+            <a:xfrm>
+              <a:off x="6817749" y="2632864"/>
+              <a:ext cx="501935" cy="1134561"/>
+            </a:xfrm>
+            <a:prstGeom prst="cube">
+              <a:avLst>
+                <a:gd name="adj" fmla="val 45000"/>
+              </a:avLst>
+            </a:prstGeom>
+            <a:solidFill>
+              <a:schemeClr val="bg1"/>
+            </a:solidFill>
+            <a:ln w="28575">
+              <a:solidFill>
+                <a:schemeClr val="tx1"/>
+              </a:solidFill>
+            </a:ln>
+          </p:spPr>
+          <p:style>
+            <a:lnRef idx="2">
+              <a:schemeClr val="accent1">
+                <a:shade val="50000"/>
+              </a:schemeClr>
+            </a:lnRef>
+            <a:fillRef idx="1">
+              <a:schemeClr val="accent1"/>
+            </a:fillRef>
+            <a:effectRef idx="0">
+              <a:schemeClr val="accent1"/>
+            </a:effectRef>
+            <a:fontRef idx="minor">
+              <a:schemeClr val="lt1"/>
+            </a:fontRef>
+          </p:style>
+          <p:txBody>
+            <a:bodyPr rtlCol="0" anchor="ctr"/>
+            <a:lstStyle/>
+            <a:p>
+              <a:pPr algn="ctr"/>
+              <a:endParaRPr lang="en-US" dirty="0">
+                <a:solidFill>
+                  <a:schemeClr val="tx1"/>
+                </a:solidFill>
+              </a:endParaRPr>
+            </a:p>
+          </p:txBody>
+        </p:sp>
+        <p:sp>
+          <p:nvSpPr>
+            <p:cNvPr id="11" name="Trapezoid 10">
+              <a:extLst>
+                <a:ext uri="{FF2B5EF4-FFF2-40B4-BE49-F238E27FC236}">
+                  <a16:creationId xmlns:a16="http://schemas.microsoft.com/office/drawing/2014/main" id="{1CA70634-410E-3D42-B0F2-CECEC72224CE}"/>
+                </a:ext>
+              </a:extLst>
+            </p:cNvPr>
+            <p:cNvSpPr/>
+            <p:nvPr/>
+          </p:nvSpPr>
+          <p:spPr>
+            <a:xfrm rot="5400000">
+              <a:off x="7060389" y="3013286"/>
+              <a:ext cx="1134561" cy="373718"/>
+            </a:xfrm>
+            <a:prstGeom prst="trapezoid">
+              <a:avLst>
+                <a:gd name="adj" fmla="val 86513"/>
+              </a:avLst>
+            </a:prstGeom>
+            <a:solidFill>
+              <a:schemeClr val="bg1"/>
+            </a:solidFill>
+            <a:ln w="50800">
+              <a:solidFill>
+                <a:schemeClr val="tx1"/>
+              </a:solidFill>
+            </a:ln>
+          </p:spPr>
+          <p:style>
+            <a:lnRef idx="2">
+              <a:schemeClr val="accent1">
+                <a:shade val="50000"/>
+              </a:schemeClr>
+            </a:lnRef>
+            <a:fillRef idx="1">
+              <a:schemeClr val="accent1"/>
+            </a:fillRef>
+            <a:effectRef idx="0">
+              <a:schemeClr val="accent1"/>
+            </a:effectRef>
+            <a:fontRef idx="minor">
+              <a:schemeClr val="lt1"/>
+            </a:fontRef>
+          </p:style>
+          <p:txBody>
+            <a:bodyPr rtlCol="0" anchor="ctr">
+              <a:scene3d>
+                <a:camera prst="orthographicFront">
+                  <a:rot lat="0" lon="0" rev="0"/>
+                </a:camera>
+                <a:lightRig rig="threePt" dir="t"/>
+              </a:scene3d>
+            </a:bodyPr>
+            <a:lstStyle/>
+            <a:p>
+              <a:pPr algn="ctr"/>
+              <a:r>
+                <a:rPr lang="en-US" sz="1000" b="1" dirty="0">
+                  <a:solidFill>
+                    <a:schemeClr val="tx1"/>
+                  </a:solidFill>
+                </a:rPr>
+                <a:t>Max Pool</a:t>
+              </a:r>
+            </a:p>
+          </p:txBody>
+        </p:sp>
+        <p:sp>
+          <p:nvSpPr>
+            <p:cNvPr id="12" name="Cube 11">
+              <a:extLst>
+                <a:ext uri="{FF2B5EF4-FFF2-40B4-BE49-F238E27FC236}">
+                  <a16:creationId xmlns:a16="http://schemas.microsoft.com/office/drawing/2014/main" id="{3FA6025E-1FBE-DF4E-B847-D4A574A4389E}"/>
+                </a:ext>
+              </a:extLst>
+            </p:cNvPr>
+            <p:cNvSpPr/>
+            <p:nvPr/>
+          </p:nvSpPr>
+          <p:spPr>
+            <a:xfrm>
+              <a:off x="7908219" y="2771775"/>
+              <a:ext cx="373719" cy="867062"/>
+            </a:xfrm>
+            <a:prstGeom prst="cube">
+              <a:avLst>
+                <a:gd name="adj" fmla="val 45000"/>
+              </a:avLst>
+            </a:prstGeom>
+            <a:solidFill>
+              <a:schemeClr val="bg1"/>
+            </a:solidFill>
+            <a:ln w="28575">
+              <a:solidFill>
+                <a:schemeClr val="tx1"/>
+              </a:solidFill>
+            </a:ln>
+          </p:spPr>
+          <p:style>
+            <a:lnRef idx="2">
+              <a:schemeClr val="accent1">
+                <a:shade val="50000"/>
+              </a:schemeClr>
+            </a:lnRef>
+            <a:fillRef idx="1">
+              <a:schemeClr val="accent1"/>
+            </a:fillRef>
+            <a:effectRef idx="0">
+              <a:schemeClr val="accent1"/>
+            </a:effectRef>
+            <a:fontRef idx="minor">
+              <a:schemeClr val="lt1"/>
+            </a:fontRef>
+          </p:style>
+          <p:txBody>
+            <a:bodyPr rtlCol="0" anchor="ctr"/>
+            <a:lstStyle/>
+            <a:p>
+              <a:pPr algn="ctr"/>
+              <a:endParaRPr lang="en-US" dirty="0">
+                <a:solidFill>
+                  <a:schemeClr val="tx1"/>
+                </a:solidFill>
+              </a:endParaRPr>
+            </a:p>
+          </p:txBody>
+        </p:sp>
+        <p:sp>
+          <p:nvSpPr>
+            <p:cNvPr id="13" name="Rectangle 12">
+              <a:extLst>
+                <a:ext uri="{FF2B5EF4-FFF2-40B4-BE49-F238E27FC236}">
+                  <a16:creationId xmlns:a16="http://schemas.microsoft.com/office/drawing/2014/main" id="{35E06323-A9E3-034A-8C0F-993B42B6E937}"/>
+                </a:ext>
+              </a:extLst>
+            </p:cNvPr>
+            <p:cNvSpPr/>
+            <p:nvPr/>
+          </p:nvSpPr>
+          <p:spPr>
+            <a:xfrm>
+              <a:off x="8359559" y="1709936"/>
+              <a:ext cx="132202" cy="2853368"/>
+            </a:xfrm>
+            <a:prstGeom prst="rect">
+              <a:avLst/>
+            </a:prstGeom>
+            <a:solidFill>
+              <a:schemeClr val="bg1"/>
+            </a:solidFill>
+            <a:ln w="38100">
+              <a:solidFill>
+                <a:schemeClr val="tx1"/>
+              </a:solidFill>
+            </a:ln>
+          </p:spPr>
+          <p:style>
+            <a:lnRef idx="2">
+              <a:schemeClr val="accent1">
+                <a:shade val="50000"/>
+              </a:schemeClr>
+            </a:lnRef>
+            <a:fillRef idx="1">
+              <a:schemeClr val="accent1"/>
+            </a:fillRef>
+            <a:effectRef idx="0">
+              <a:schemeClr val="accent1"/>
+            </a:effectRef>
+            <a:fontRef idx="minor">
+              <a:schemeClr val="lt1"/>
+            </a:fontRef>
+          </p:style>
+          <p:txBody>
+            <a:bodyPr rtlCol="0" anchor="ctr"/>
+            <a:lstStyle/>
+            <a:p>
+              <a:pPr algn="ctr"/>
+              <a:endParaRPr lang="en-US" dirty="0"/>
+            </a:p>
+          </p:txBody>
+        </p:sp>
+        <p:sp>
+          <p:nvSpPr>
+            <p:cNvPr id="14" name="Rectangle 13">
+              <a:extLst>
+                <a:ext uri="{FF2B5EF4-FFF2-40B4-BE49-F238E27FC236}">
+                  <a16:creationId xmlns:a16="http://schemas.microsoft.com/office/drawing/2014/main" id="{9D0A1676-B982-5444-893A-C8FE6D6966F8}"/>
+                </a:ext>
+              </a:extLst>
+            </p:cNvPr>
+            <p:cNvSpPr/>
+            <p:nvPr/>
+          </p:nvSpPr>
+          <p:spPr>
+            <a:xfrm>
+              <a:off x="8603016" y="1709936"/>
+              <a:ext cx="132202" cy="2853368"/>
+            </a:xfrm>
+            <a:prstGeom prst="rect">
+              <a:avLst/>
+            </a:prstGeom>
+            <a:solidFill>
+              <a:schemeClr val="bg1"/>
+            </a:solidFill>
+            <a:ln w="38100">
+              <a:solidFill>
+                <a:schemeClr val="tx1"/>
+              </a:solidFill>
+            </a:ln>
+          </p:spPr>
+          <p:style>
+            <a:lnRef idx="2">
+              <a:schemeClr val="accent1">
+                <a:shade val="50000"/>
+              </a:schemeClr>
+            </a:lnRef>
+            <a:fillRef idx="1">
+              <a:schemeClr val="accent1"/>
+            </a:fillRef>
+            <a:effectRef idx="0">
+              <a:schemeClr val="accent1"/>
+            </a:effectRef>
+            <a:fontRef idx="minor">
+              <a:schemeClr val="lt1"/>
+            </a:fontRef>
+          </p:style>
+          <p:txBody>
+            <a:bodyPr rtlCol="0" anchor="ctr"/>
+            <a:lstStyle/>
+            <a:p>
+              <a:pPr algn="ctr"/>
+              <a:endParaRPr lang="en-US" dirty="0"/>
+            </a:p>
+          </p:txBody>
+        </p:sp>
+        <p:sp>
+          <p:nvSpPr>
+            <p:cNvPr id="15" name="Rectangle 14">
+              <a:extLst>
+                <a:ext uri="{FF2B5EF4-FFF2-40B4-BE49-F238E27FC236}">
+                  <a16:creationId xmlns:a16="http://schemas.microsoft.com/office/drawing/2014/main" id="{9C3BED62-B44C-864D-844F-586FBE476ADE}"/>
+                </a:ext>
+              </a:extLst>
+            </p:cNvPr>
+            <p:cNvSpPr/>
+            <p:nvPr/>
+          </p:nvSpPr>
+          <p:spPr>
+            <a:xfrm>
+              <a:off x="8854404" y="1709936"/>
+              <a:ext cx="132202" cy="2853368"/>
+            </a:xfrm>
+            <a:prstGeom prst="rect">
+              <a:avLst/>
+            </a:prstGeom>
+            <a:solidFill>
+              <a:schemeClr val="bg1"/>
+            </a:solidFill>
+            <a:ln w="38100">
+              <a:solidFill>
+                <a:schemeClr val="tx1"/>
+              </a:solidFill>
+            </a:ln>
+          </p:spPr>
+          <p:style>
+            <a:lnRef idx="2">
+              <a:schemeClr val="accent1">
+                <a:shade val="50000"/>
+              </a:schemeClr>
+            </a:lnRef>
+            <a:fillRef idx="1">
+              <a:schemeClr val="accent1"/>
+            </a:fillRef>
+            <a:effectRef idx="0">
+              <a:schemeClr val="accent1"/>
+            </a:effectRef>
+            <a:fontRef idx="minor">
+              <a:schemeClr val="lt1"/>
+            </a:fontRef>
+          </p:style>
+          <p:txBody>
+            <a:bodyPr rtlCol="0" anchor="ctr"/>
+            <a:lstStyle/>
+            <a:p>
+              <a:pPr algn="ctr"/>
+              <a:endParaRPr lang="en-US" dirty="0"/>
+            </a:p>
+          </p:txBody>
+        </p:sp>
+        <p:sp>
+          <p:nvSpPr>
+            <p:cNvPr id="18" name="Rectangle 17">
+              <a:extLst>
+                <a:ext uri="{FF2B5EF4-FFF2-40B4-BE49-F238E27FC236}">
+                  <a16:creationId xmlns:a16="http://schemas.microsoft.com/office/drawing/2014/main" id="{48284C15-8E00-3D44-986D-8D198A48F0DA}"/>
+                </a:ext>
+              </a:extLst>
+            </p:cNvPr>
+            <p:cNvSpPr/>
+            <p:nvPr/>
+          </p:nvSpPr>
+          <p:spPr>
+            <a:xfrm>
+              <a:off x="9368198" y="2632864"/>
+              <a:ext cx="295456" cy="1235869"/>
+            </a:xfrm>
+            <a:prstGeom prst="rect">
+              <a:avLst/>
+            </a:prstGeom>
+            <a:solidFill>
+              <a:schemeClr val="bg1"/>
+            </a:solidFill>
+            <a:ln w="38100">
+              <a:solidFill>
+                <a:schemeClr val="tx1"/>
+              </a:solidFill>
+            </a:ln>
+          </p:spPr>
+          <p:style>
+            <a:lnRef idx="2">
+              <a:schemeClr val="accent1">
+                <a:shade val="50000"/>
+              </a:schemeClr>
+            </a:lnRef>
+            <a:fillRef idx="1">
+              <a:schemeClr val="accent1"/>
+            </a:fillRef>
+            <a:effectRef idx="0">
+              <a:schemeClr val="accent1"/>
+            </a:effectRef>
+            <a:fontRef idx="minor">
+              <a:schemeClr val="lt1"/>
+            </a:fontRef>
+          </p:style>
+          <p:txBody>
+            <a:bodyPr rtlCol="0" anchor="ctr"/>
+            <a:lstStyle/>
+            <a:p>
+              <a:pPr algn="ctr"/>
+              <a:endParaRPr lang="en-US"/>
+            </a:p>
+          </p:txBody>
+        </p:sp>
+        <p:sp>
+          <p:nvSpPr>
+            <p:cNvPr id="19" name="Oval 18">
+              <a:extLst>
+                <a:ext uri="{FF2B5EF4-FFF2-40B4-BE49-F238E27FC236}">
+                  <a16:creationId xmlns:a16="http://schemas.microsoft.com/office/drawing/2014/main" id="{51B386C2-0586-1B4D-8FF7-C670F1C07163}"/>
+                </a:ext>
+              </a:extLst>
+            </p:cNvPr>
+            <p:cNvSpPr/>
+            <p:nvPr/>
+          </p:nvSpPr>
+          <p:spPr>
+            <a:xfrm>
+              <a:off x="9406203" y="2804511"/>
+              <a:ext cx="216000" cy="216000"/>
+            </a:xfrm>
+            <a:prstGeom prst="ellipse">
+              <a:avLst/>
+            </a:prstGeom>
+            <a:solidFill>
+              <a:srgbClr val="92D050"/>
+            </a:solidFill>
+          </p:spPr>
+          <p:style>
+            <a:lnRef idx="2">
+              <a:schemeClr val="accent1">
+                <a:shade val="50000"/>
+              </a:schemeClr>
+            </a:lnRef>
+            <a:fillRef idx="1">
+              <a:schemeClr val="accent1"/>
+            </a:fillRef>
+            <a:effectRef idx="0">
+              <a:schemeClr val="accent1"/>
+            </a:effectRef>
+            <a:fontRef idx="minor">
+              <a:schemeClr val="lt1"/>
+            </a:fontRef>
+          </p:style>
+          <p:txBody>
+            <a:bodyPr rtlCol="0" anchor="ctr"/>
+            <a:lstStyle/>
+            <a:p>
+              <a:pPr algn="ctr"/>
+              <a:endParaRPr lang="en-US" dirty="0"/>
+            </a:p>
+          </p:txBody>
+        </p:sp>
+        <p:sp>
+          <p:nvSpPr>
+            <p:cNvPr id="20" name="Oval 19">
+              <a:extLst>
+                <a:ext uri="{FF2B5EF4-FFF2-40B4-BE49-F238E27FC236}">
+                  <a16:creationId xmlns:a16="http://schemas.microsoft.com/office/drawing/2014/main" id="{B6B7CF3C-65C1-7F4C-B687-CCCC092AA5F7}"/>
+                </a:ext>
+              </a:extLst>
+            </p:cNvPr>
+            <p:cNvSpPr/>
+            <p:nvPr/>
+          </p:nvSpPr>
+          <p:spPr>
+            <a:xfrm>
+              <a:off x="9400818" y="3515762"/>
+              <a:ext cx="216000" cy="216000"/>
+            </a:xfrm>
+            <a:prstGeom prst="ellipse">
+              <a:avLst/>
+            </a:prstGeom>
+            <a:solidFill>
+              <a:srgbClr val="FF0000"/>
+            </a:solidFill>
+          </p:spPr>
+          <p:style>
+            <a:lnRef idx="2">
+              <a:schemeClr val="accent1">
+                <a:shade val="50000"/>
+              </a:schemeClr>
+            </a:lnRef>
+            <a:fillRef idx="1">
+              <a:schemeClr val="accent1"/>
+            </a:fillRef>
+            <a:effectRef idx="0">
+              <a:schemeClr val="accent1"/>
+            </a:effectRef>
+            <a:fontRef idx="minor">
+              <a:schemeClr val="lt1"/>
+            </a:fontRef>
+          </p:style>
+          <p:txBody>
+            <a:bodyPr rtlCol="0" anchor="ctr"/>
+            <a:lstStyle/>
+            <a:p>
+              <a:pPr algn="ctr"/>
+              <a:endParaRPr lang="en-US"/>
+            </a:p>
+          </p:txBody>
+        </p:sp>
+        <p:sp>
+          <p:nvSpPr>
+            <p:cNvPr id="21" name="Left Brace 20">
+              <a:extLst>
+                <a:ext uri="{FF2B5EF4-FFF2-40B4-BE49-F238E27FC236}">
+                  <a16:creationId xmlns:a16="http://schemas.microsoft.com/office/drawing/2014/main" id="{0246B23A-64C9-D74A-9C0E-FD093829931E}"/>
+                </a:ext>
+              </a:extLst>
+            </p:cNvPr>
+            <p:cNvSpPr/>
+            <p:nvPr/>
+          </p:nvSpPr>
+          <p:spPr>
+            <a:xfrm rot="16200000">
+              <a:off x="8395917" y="4659467"/>
+              <a:ext cx="572873" cy="735670"/>
+            </a:xfrm>
+            <a:prstGeom prst="leftBrace">
+              <a:avLst/>
+            </a:prstGeom>
+            <a:ln w="34925">
+              <a:solidFill>
+                <a:schemeClr val="tx1"/>
+              </a:solidFill>
+            </a:ln>
+          </p:spPr>
+          <p:style>
+            <a:lnRef idx="1">
+              <a:schemeClr val="accent1"/>
+            </a:lnRef>
+            <a:fillRef idx="0">
+              <a:schemeClr val="accent1"/>
+            </a:fillRef>
+            <a:effectRef idx="0">
+              <a:schemeClr val="accent1"/>
+            </a:effectRef>
+            <a:fontRef idx="minor">
+              <a:schemeClr val="tx1"/>
+            </a:fontRef>
+          </p:style>
+          <p:txBody>
+            <a:bodyPr rtlCol="0" anchor="ctr"/>
+            <a:lstStyle/>
+            <a:p>
+              <a:pPr algn="ctr"/>
+              <a:endParaRPr lang="en-US"/>
+            </a:p>
+          </p:txBody>
+        </p:sp>
+        <p:sp>
+          <p:nvSpPr>
+            <p:cNvPr id="22" name="TextBox 21">
+              <a:extLst>
+                <a:ext uri="{FF2B5EF4-FFF2-40B4-BE49-F238E27FC236}">
+                  <a16:creationId xmlns:a16="http://schemas.microsoft.com/office/drawing/2014/main" id="{3998EBC3-B6E1-4A4F-838C-428C4BAB02E7}"/>
+                </a:ext>
+              </a:extLst>
+            </p:cNvPr>
+            <p:cNvSpPr txBox="1"/>
+            <p:nvPr/>
+          </p:nvSpPr>
+          <p:spPr>
+            <a:xfrm>
+              <a:off x="7838408" y="5366997"/>
+              <a:ext cx="1661417" cy="369332"/>
+            </a:xfrm>
+            <a:prstGeom prst="rect">
+              <a:avLst/>
+            </a:prstGeom>
+            <a:noFill/>
+          </p:spPr>
+          <p:txBody>
+            <a:bodyPr wrap="none" rtlCol="0">
+              <a:spAutoFit/>
+            </a:bodyPr>
+            <a:lstStyle/>
+            <a:p>
+              <a:r>
+                <a:rPr lang="en-US" dirty="0"/>
+                <a:t>Fully connected</a:t>
+              </a:r>
+            </a:p>
+          </p:txBody>
+        </p:sp>
+        <p:sp>
+          <p:nvSpPr>
+            <p:cNvPr id="23" name="Left Brace 22">
+              <a:extLst>
+                <a:ext uri="{FF2B5EF4-FFF2-40B4-BE49-F238E27FC236}">
+                  <a16:creationId xmlns:a16="http://schemas.microsoft.com/office/drawing/2014/main" id="{B9E7CD24-C831-E642-9A6B-02035106E335}"/>
+                </a:ext>
+              </a:extLst>
+            </p:cNvPr>
+            <p:cNvSpPr/>
+            <p:nvPr/>
+          </p:nvSpPr>
+          <p:spPr>
+            <a:xfrm rot="16200000">
+              <a:off x="4737971" y="1969303"/>
+              <a:ext cx="572873" cy="6196365"/>
+            </a:xfrm>
+            <a:prstGeom prst="leftBrace">
+              <a:avLst/>
+            </a:prstGeom>
+            <a:ln w="34925">
+              <a:solidFill>
+                <a:schemeClr val="tx1"/>
+              </a:solidFill>
+            </a:ln>
+          </p:spPr>
+          <p:style>
+            <a:lnRef idx="1">
+              <a:schemeClr val="accent1"/>
+            </a:lnRef>
+            <a:fillRef idx="0">
+              <a:schemeClr val="accent1"/>
+            </a:fillRef>
+            <a:effectRef idx="0">
+              <a:schemeClr val="accent1"/>
+            </a:effectRef>
+            <a:fontRef idx="minor">
+              <a:schemeClr val="tx1"/>
+            </a:fontRef>
+          </p:style>
+          <p:txBody>
+            <a:bodyPr rtlCol="0" anchor="ctr"/>
+            <a:lstStyle/>
+            <a:p>
+              <a:pPr algn="ctr"/>
+              <a:endParaRPr lang="en-US"/>
+            </a:p>
+          </p:txBody>
+        </p:sp>
+        <p:sp>
+          <p:nvSpPr>
+            <p:cNvPr id="24" name="TextBox 23">
+              <a:extLst>
+                <a:ext uri="{FF2B5EF4-FFF2-40B4-BE49-F238E27FC236}">
+                  <a16:creationId xmlns:a16="http://schemas.microsoft.com/office/drawing/2014/main" id="{60E44939-13B0-1249-86A6-DC2B0230D2F6}"/>
+                </a:ext>
+              </a:extLst>
+            </p:cNvPr>
+            <p:cNvSpPr txBox="1"/>
+            <p:nvPr/>
+          </p:nvSpPr>
+          <p:spPr>
+            <a:xfrm>
+              <a:off x="3673748" y="5359285"/>
+              <a:ext cx="2701317" cy="369332"/>
+            </a:xfrm>
+            <a:prstGeom prst="rect">
+              <a:avLst/>
+            </a:prstGeom>
+            <a:noFill/>
+          </p:spPr>
+          <p:txBody>
+            <a:bodyPr wrap="none" rtlCol="0">
+              <a:spAutoFit/>
+            </a:bodyPr>
+            <a:lstStyle/>
+            <a:p>
+              <a:r>
+                <a:rPr lang="en-US" dirty="0"/>
+                <a:t>Convolution + Max pooling</a:t>
+              </a:r>
+            </a:p>
+          </p:txBody>
+        </p:sp>
+        <p:sp>
+          <p:nvSpPr>
+            <p:cNvPr id="25" name="TextBox 24">
+              <a:extLst>
+                <a:ext uri="{FF2B5EF4-FFF2-40B4-BE49-F238E27FC236}">
+                  <a16:creationId xmlns:a16="http://schemas.microsoft.com/office/drawing/2014/main" id="{DE11B80C-16C7-1A49-B6F5-5DADBD00809C}"/>
+                </a:ext>
+              </a:extLst>
+            </p:cNvPr>
+            <p:cNvSpPr txBox="1"/>
+            <p:nvPr/>
+          </p:nvSpPr>
+          <p:spPr>
+            <a:xfrm>
+              <a:off x="8999960" y="4461902"/>
+              <a:ext cx="1017715" cy="369332"/>
+            </a:xfrm>
+            <a:prstGeom prst="rect">
+              <a:avLst/>
+            </a:prstGeom>
+            <a:noFill/>
+          </p:spPr>
+          <p:txBody>
+            <a:bodyPr wrap="none" rtlCol="0">
+              <a:spAutoFit/>
+            </a:bodyPr>
+            <a:lstStyle/>
+            <a:p>
+              <a:r>
+                <a:rPr lang="en-US" dirty="0"/>
+                <a:t>Soft Max</a:t>
+              </a:r>
+            </a:p>
+          </p:txBody>
+        </p:sp>
+        <p:sp>
+          <p:nvSpPr>
+            <p:cNvPr id="26" name="Left Brace 25">
+              <a:extLst>
+                <a:ext uri="{FF2B5EF4-FFF2-40B4-BE49-F238E27FC236}">
+                  <a16:creationId xmlns:a16="http://schemas.microsoft.com/office/drawing/2014/main" id="{E5C6C16D-252F-6B44-8E6F-6CDB9C0B4C5F}"/>
+                </a:ext>
+              </a:extLst>
+            </p:cNvPr>
+            <p:cNvSpPr/>
+            <p:nvPr/>
+          </p:nvSpPr>
+          <p:spPr>
+            <a:xfrm rot="16200000">
+              <a:off x="9236337" y="3869111"/>
+              <a:ext cx="572873" cy="506193"/>
+            </a:xfrm>
+            <a:prstGeom prst="leftBrace">
+              <a:avLst/>
+            </a:prstGeom>
+            <a:ln w="34925">
+              <a:solidFill>
+                <a:schemeClr val="tx1"/>
+              </a:solidFill>
+            </a:ln>
+          </p:spPr>
+          <p:style>
+            <a:lnRef idx="1">
+              <a:schemeClr val="accent1"/>
+            </a:lnRef>
+            <a:fillRef idx="0">
+              <a:schemeClr val="accent1"/>
+            </a:fillRef>
+            <a:effectRef idx="0">
+              <a:schemeClr val="accent1"/>
+            </a:effectRef>
+            <a:fontRef idx="minor">
+              <a:schemeClr val="tx1"/>
+            </a:fontRef>
+          </p:style>
+          <p:txBody>
+            <a:bodyPr rtlCol="0" anchor="ctr"/>
+            <a:lstStyle/>
+            <a:p>
+              <a:pPr algn="ctr"/>
+              <a:endParaRPr lang="en-US"/>
+            </a:p>
+          </p:txBody>
+        </p:sp>
+        <p:sp>
+          <p:nvSpPr>
+            <p:cNvPr id="27" name="TextBox 26">
+              <a:extLst>
+                <a:ext uri="{FF2B5EF4-FFF2-40B4-BE49-F238E27FC236}">
+                  <a16:creationId xmlns:a16="http://schemas.microsoft.com/office/drawing/2014/main" id="{60A8C5DE-666C-1A45-BBAD-42FFBC34A645}"/>
+                </a:ext>
+              </a:extLst>
+            </p:cNvPr>
+            <p:cNvSpPr txBox="1"/>
+            <p:nvPr/>
+          </p:nvSpPr>
+          <p:spPr>
+            <a:xfrm>
+              <a:off x="9751215" y="2737234"/>
+              <a:ext cx="838691" cy="369332"/>
+            </a:xfrm>
+            <a:prstGeom prst="rect">
+              <a:avLst/>
+            </a:prstGeom>
+            <a:noFill/>
+          </p:spPr>
+          <p:txBody>
+            <a:bodyPr wrap="none" rtlCol="0">
+              <a:spAutoFit/>
+            </a:bodyPr>
+            <a:lstStyle/>
+            <a:p>
+              <a:r>
+                <a:rPr lang="en-US" dirty="0"/>
+                <a:t>Beauty</a:t>
+              </a:r>
+            </a:p>
+          </p:txBody>
+        </p:sp>
+        <p:sp>
+          <p:nvSpPr>
+            <p:cNvPr id="28" name="TextBox 27">
+              <a:extLst>
+                <a:ext uri="{FF2B5EF4-FFF2-40B4-BE49-F238E27FC236}">
+                  <a16:creationId xmlns:a16="http://schemas.microsoft.com/office/drawing/2014/main" id="{7626E829-77D5-7B4B-9B51-9CC67AE4E6E9}"/>
+                </a:ext>
+              </a:extLst>
+            </p:cNvPr>
+            <p:cNvSpPr txBox="1"/>
+            <p:nvPr/>
+          </p:nvSpPr>
+          <p:spPr>
+            <a:xfrm>
+              <a:off x="9727698" y="3448485"/>
+              <a:ext cx="598241" cy="369332"/>
+            </a:xfrm>
+            <a:prstGeom prst="rect">
+              <a:avLst/>
+            </a:prstGeom>
+            <a:noFill/>
+          </p:spPr>
+          <p:txBody>
+            <a:bodyPr wrap="none" rtlCol="0">
+              <a:spAutoFit/>
+            </a:bodyPr>
+            <a:lstStyle/>
+            <a:p>
+              <a:r>
+                <a:rPr lang="en-US" dirty="0"/>
+                <a:t>Ugly</a:t>
+              </a:r>
+            </a:p>
+          </p:txBody>
+        </p:sp>
+        <p:cxnSp>
+          <p:nvCxnSpPr>
+            <p:cNvPr id="29" name="Straight Arrow Connector 28">
+              <a:extLst>
+                <a:ext uri="{FF2B5EF4-FFF2-40B4-BE49-F238E27FC236}">
+                  <a16:creationId xmlns:a16="http://schemas.microsoft.com/office/drawing/2014/main" id="{C8545555-F78F-724E-A3CB-B2080C530958}"/>
+                </a:ext>
+              </a:extLst>
+            </p:cNvPr>
+            <p:cNvCxnSpPr>
+              <a:cxnSpLocks/>
+            </p:cNvCxnSpPr>
+            <p:nvPr/>
+          </p:nvCxnSpPr>
+          <p:spPr>
+            <a:xfrm>
+              <a:off x="2185988" y="1571625"/>
+              <a:ext cx="7477666" cy="0"/>
+            </a:xfrm>
+            <a:prstGeom prst="straightConnector1">
+              <a:avLst/>
+            </a:prstGeom>
+            <a:ln w="44450">
+              <a:solidFill>
+                <a:schemeClr val="tx1"/>
+              </a:solidFill>
+              <a:headEnd type="triangle"/>
+              <a:tailEnd type="triangle"/>
+            </a:ln>
+          </p:spPr>
+          <p:style>
+            <a:lnRef idx="1">
+              <a:schemeClr val="accent1"/>
+            </a:lnRef>
+            <a:fillRef idx="0">
+              <a:schemeClr val="accent1"/>
+            </a:fillRef>
+            <a:effectRef idx="0">
+              <a:schemeClr val="accent1"/>
+            </a:effectRef>
+            <a:fontRef idx="minor">
+              <a:schemeClr val="tx1"/>
+            </a:fontRef>
+          </p:style>
+        </p:cxnSp>
+        <p:sp>
+          <p:nvSpPr>
+            <p:cNvPr id="33" name="TextBox 32">
+              <a:extLst>
+                <a:ext uri="{FF2B5EF4-FFF2-40B4-BE49-F238E27FC236}">
+                  <a16:creationId xmlns:a16="http://schemas.microsoft.com/office/drawing/2014/main" id="{F32C7351-BA55-DF45-A336-9DF737687DAE}"/>
+                </a:ext>
+              </a:extLst>
+            </p:cNvPr>
+            <p:cNvSpPr txBox="1"/>
+            <p:nvPr/>
+          </p:nvSpPr>
+          <p:spPr>
+            <a:xfrm>
+              <a:off x="5158174" y="1212767"/>
+              <a:ext cx="1042273" cy="369332"/>
+            </a:xfrm>
+            <a:prstGeom prst="rect">
+              <a:avLst/>
+            </a:prstGeom>
+            <a:noFill/>
+          </p:spPr>
+          <p:txBody>
+            <a:bodyPr wrap="none" rtlCol="0">
+              <a:spAutoFit/>
+            </a:bodyPr>
+            <a:lstStyle/>
+            <a:p>
+              <a:r>
+                <a:rPr lang="en-US" b="1" dirty="0"/>
+                <a:t>Classifier</a:t>
+              </a:r>
+            </a:p>
+          </p:txBody>
+        </p:sp>
+        <p:pic>
+          <p:nvPicPr>
+            <p:cNvPr id="34" name="Shape 117">
+              <a:extLst>
+                <a:ext uri="{FF2B5EF4-FFF2-40B4-BE49-F238E27FC236}">
+                  <a16:creationId xmlns:a16="http://schemas.microsoft.com/office/drawing/2014/main" id="{27773BA7-8F53-504F-9275-6835B25D5403}"/>
+                </a:ext>
+              </a:extLst>
+            </p:cNvPr>
+            <p:cNvPicPr preferRelativeResize="0"/>
+            <p:nvPr/>
+          </p:nvPicPr>
+          <p:blipFill>
+            <a:blip r:embed="rId2">
+              <a:alphaModFix/>
+            </a:blip>
+            <a:stretch>
+              <a:fillRect/>
+            </a:stretch>
+          </p:blipFill>
+          <p:spPr>
+            <a:xfrm>
+              <a:off x="330349" y="2349000"/>
+              <a:ext cx="1080000" cy="1080000"/>
+            </a:xfrm>
+            <a:prstGeom prst="rect">
+              <a:avLst/>
+            </a:prstGeom>
+            <a:noFill/>
+            <a:ln>
+              <a:noFill/>
+            </a:ln>
+          </p:spPr>
+        </p:pic>
+        <p:pic>
+          <p:nvPicPr>
+            <p:cNvPr id="35" name="Shape 118">
+              <a:extLst>
+                <a:ext uri="{FF2B5EF4-FFF2-40B4-BE49-F238E27FC236}">
+                  <a16:creationId xmlns:a16="http://schemas.microsoft.com/office/drawing/2014/main" id="{84BE0398-BE96-6244-8F68-AF9CBF1DD1B3}"/>
+                </a:ext>
+              </a:extLst>
+            </p:cNvPr>
+            <p:cNvPicPr preferRelativeResize="0"/>
+            <p:nvPr/>
+          </p:nvPicPr>
+          <p:blipFill>
+            <a:blip r:embed="rId3">
+              <a:alphaModFix/>
+            </a:blip>
+            <a:stretch>
+              <a:fillRect/>
+            </a:stretch>
+          </p:blipFill>
+          <p:spPr>
+            <a:xfrm>
+              <a:off x="494604" y="2566566"/>
+              <a:ext cx="1080000" cy="1080000"/>
+            </a:xfrm>
+            <a:prstGeom prst="rect">
+              <a:avLst/>
+            </a:prstGeom>
+            <a:noFill/>
+            <a:ln>
+              <a:noFill/>
+            </a:ln>
+          </p:spPr>
+        </p:pic>
+        <p:pic>
+          <p:nvPicPr>
+            <p:cNvPr id="39" name="Shape 122">
+              <a:extLst>
+                <a:ext uri="{FF2B5EF4-FFF2-40B4-BE49-F238E27FC236}">
+                  <a16:creationId xmlns:a16="http://schemas.microsoft.com/office/drawing/2014/main" id="{EF4C6102-774F-7847-819E-92048469AE1C}"/>
+                </a:ext>
+              </a:extLst>
+            </p:cNvPr>
+            <p:cNvPicPr preferRelativeResize="0"/>
+            <p:nvPr/>
+          </p:nvPicPr>
+          <p:blipFill>
+            <a:blip r:embed="rId4">
+              <a:alphaModFix/>
+            </a:blip>
+            <a:stretch>
+              <a:fillRect/>
+            </a:stretch>
+          </p:blipFill>
+          <p:spPr>
+            <a:xfrm>
+              <a:off x="662510" y="2755771"/>
+              <a:ext cx="1080000" cy="1080000"/>
+            </a:xfrm>
+            <a:prstGeom prst="rect">
+              <a:avLst/>
+            </a:prstGeom>
+            <a:noFill/>
+            <a:ln>
+              <a:noFill/>
+            </a:ln>
+          </p:spPr>
+        </p:pic>
+        <p:cxnSp>
+          <p:nvCxnSpPr>
+            <p:cNvPr id="40" name="Shape 123">
+              <a:extLst>
+                <a:ext uri="{FF2B5EF4-FFF2-40B4-BE49-F238E27FC236}">
+                  <a16:creationId xmlns:a16="http://schemas.microsoft.com/office/drawing/2014/main" id="{F5078658-3292-C641-AD5C-B6F2F3D9A5AC}"/>
+                </a:ext>
+              </a:extLst>
+            </p:cNvPr>
+            <p:cNvCxnSpPr>
+              <a:cxnSpLocks/>
+            </p:cNvCxnSpPr>
+            <p:nvPr/>
+          </p:nvCxnSpPr>
+          <p:spPr>
+            <a:xfrm flipV="1">
+              <a:off x="1001236" y="6105469"/>
+              <a:ext cx="4887286" cy="7194"/>
+            </a:xfrm>
+            <a:prstGeom prst="straightConnector1">
+              <a:avLst/>
+            </a:prstGeom>
+            <a:noFill/>
+            <a:ln w="28575" cap="flat" cmpd="sng">
+              <a:solidFill>
+                <a:schemeClr val="bg1"/>
+              </a:solidFill>
+              <a:prstDash val="solid"/>
+              <a:round/>
+              <a:headEnd type="none" w="lg" len="lg"/>
+              <a:tailEnd type="triangle" w="lg" len="lg"/>
+            </a:ln>
+          </p:spPr>
+        </p:cxnSp>
+        <p:pic>
+          <p:nvPicPr>
+            <p:cNvPr id="36" name="Shape 119">
+              <a:extLst>
+                <a:ext uri="{FF2B5EF4-FFF2-40B4-BE49-F238E27FC236}">
+                  <a16:creationId xmlns:a16="http://schemas.microsoft.com/office/drawing/2014/main" id="{10FE799F-0A85-B74C-81B0-701E06E405BE}"/>
+                </a:ext>
+              </a:extLst>
+            </p:cNvPr>
+            <p:cNvPicPr preferRelativeResize="0"/>
+            <p:nvPr/>
+          </p:nvPicPr>
+          <p:blipFill>
+            <a:blip r:embed="rId5">
+              <a:alphaModFix/>
+            </a:blip>
+            <a:stretch>
+              <a:fillRect/>
+            </a:stretch>
+          </p:blipFill>
+          <p:spPr>
+            <a:xfrm>
+              <a:off x="809812" y="2941771"/>
+              <a:ext cx="1080000" cy="1080000"/>
+            </a:xfrm>
+            <a:prstGeom prst="rect">
+              <a:avLst/>
+            </a:prstGeom>
+            <a:noFill/>
+            <a:ln>
+              <a:noFill/>
+            </a:ln>
+          </p:spPr>
+        </p:pic>
+        <p:sp>
+          <p:nvSpPr>
+            <p:cNvPr id="41" name="Left Brace 40">
+              <a:extLst>
+                <a:ext uri="{FF2B5EF4-FFF2-40B4-BE49-F238E27FC236}">
+                  <a16:creationId xmlns:a16="http://schemas.microsoft.com/office/drawing/2014/main" id="{30F8D457-BF20-664F-9806-5F3C3DA9EB65}"/>
+                </a:ext>
+              </a:extLst>
+            </p:cNvPr>
+            <p:cNvSpPr/>
+            <p:nvPr/>
+          </p:nvSpPr>
+          <p:spPr>
+            <a:xfrm rot="16200000">
+              <a:off x="791984" y="3838825"/>
+              <a:ext cx="572873" cy="1328181"/>
+            </a:xfrm>
+            <a:prstGeom prst="leftBrace">
+              <a:avLst/>
+            </a:prstGeom>
+            <a:ln w="34925">
+              <a:solidFill>
+                <a:schemeClr val="tx1"/>
+              </a:solidFill>
+            </a:ln>
+          </p:spPr>
+          <p:style>
+            <a:lnRef idx="1">
+              <a:schemeClr val="accent1"/>
+            </a:lnRef>
+            <a:fillRef idx="0">
+              <a:schemeClr val="accent1"/>
+            </a:fillRef>
+            <a:effectRef idx="0">
+              <a:schemeClr val="accent1"/>
+            </a:effectRef>
+            <a:fontRef idx="minor">
+              <a:schemeClr val="tx1"/>
+            </a:fontRef>
+          </p:style>
+          <p:txBody>
+            <a:bodyPr rtlCol="0" anchor="ctr"/>
+            <a:lstStyle/>
+            <a:p>
+              <a:pPr algn="ctr"/>
+              <a:endParaRPr lang="en-US"/>
+            </a:p>
+          </p:txBody>
+        </p:sp>
+        <p:sp>
+          <p:nvSpPr>
+            <p:cNvPr id="42" name="TextBox 41">
+              <a:extLst>
+                <a:ext uri="{FF2B5EF4-FFF2-40B4-BE49-F238E27FC236}">
+                  <a16:creationId xmlns:a16="http://schemas.microsoft.com/office/drawing/2014/main" id="{98949239-8303-9F49-B7A0-F94AF3A7B58C}"/>
+                </a:ext>
+              </a:extLst>
+            </p:cNvPr>
+            <p:cNvSpPr txBox="1"/>
+            <p:nvPr/>
+          </p:nvSpPr>
+          <p:spPr>
+            <a:xfrm>
+              <a:off x="377106" y="4871583"/>
+              <a:ext cx="1402628" cy="369332"/>
+            </a:xfrm>
+            <a:prstGeom prst="rect">
+              <a:avLst/>
+            </a:prstGeom>
+            <a:noFill/>
+          </p:spPr>
+          <p:txBody>
+            <a:bodyPr wrap="none" rtlCol="0">
+              <a:spAutoFit/>
+            </a:bodyPr>
+            <a:lstStyle/>
+            <a:p>
+              <a:r>
+                <a:rPr lang="en-US" dirty="0"/>
+                <a:t>Input Images</a:t>
+              </a:r>
+            </a:p>
+          </p:txBody>
+        </p:sp>
+      </p:grpSp>
+    </p:spTree>
+    <p:extLst>
+      <p:ext uri="{BB962C8B-B14F-4D97-AF65-F5344CB8AC3E}">
+        <p14:creationId xmlns:p14="http://schemas.microsoft.com/office/powerpoint/2010/main" val="3823169487"/>
+      </p:ext>
+    </p:extLst>
+  </p:cSld>
+  <p:clrMapOvr>
+    <a:masterClrMapping/>
+  </p:clrMapOvr>
+</p:sld>
+</file>
+
 <file path=ppt/theme/theme1.xml><?xml version="1.0" encoding="utf-8"?>
 <a:theme xmlns:a="http://schemas.openxmlformats.org/drawingml/2006/main" name="Office Theme">
   <a:themeElements>

</xml_diff>